<commit_message>
updating system design notes
</commit_message>
<xml_diff>
--- a/design/System Design Notes.pptx
+++ b/design/System Design Notes.pptx
@@ -5,7 +5,11 @@
     <p:sldMasterId id="2147483648" r:id="rId1"/>
   </p:sldMasterIdLst>
   <p:sldIdLst>
-    <p:sldId id="256" r:id="rId2"/>
+    <p:sldId id="257" r:id="rId2"/>
+    <p:sldId id="258" r:id="rId3"/>
+    <p:sldId id="259" r:id="rId4"/>
+    <p:sldId id="260" r:id="rId5"/>
+    <p:sldId id="256" r:id="rId6"/>
   </p:sldIdLst>
   <p:sldSz cx="12192000" cy="6858000"/>
   <p:notesSz cx="6858000" cy="9144000"/>
@@ -2971,14 +2975,520 @@
       </p:grpSpPr>
       <p:sp>
         <p:nvSpPr>
-          <p:cNvPr id="4" name="TextBox 3"/>
+          <p:cNvPr id="3" name="Content Placeholder 2"/>
+          <p:cNvSpPr>
+            <a:spLocks noGrp="1"/>
+          </p:cNvSpPr>
+          <p:nvPr>
+            <p:ph idx="1"/>
+          </p:nvPr>
+        </p:nvSpPr>
+        <p:spPr>
+          <a:xfrm>
+            <a:off x="838200" y="420130"/>
+            <a:ext cx="5093043" cy="5756833"/>
+          </a:xfrm>
+        </p:spPr>
+        <p:txBody>
+          <a:bodyPr/>
+          <a:lstStyle/>
+          <a:p>
+            <a:r>
+              <a:rPr lang="en-US" b="1" dirty="0" smtClean="0">
+                <a:solidFill>
+                  <a:schemeClr val="accent2"/>
+                </a:solidFill>
+              </a:rPr>
+              <a:t>Horizontal Scaling</a:t>
+            </a:r>
+            <a:r>
+              <a:rPr lang="en-US" dirty="0" smtClean="0"/>
+              <a:t/>
+            </a:r>
+            <a:br>
+              <a:rPr lang="en-US" dirty="0" smtClean="0"/>
+            </a:br>
+            <a:endParaRPr lang="en-US" dirty="0" smtClean="0"/>
+          </a:p>
+          <a:p>
+            <a:r>
+              <a:rPr lang="en-US" dirty="0" smtClean="0"/>
+              <a:t>Load Balancing required</a:t>
+            </a:r>
+          </a:p>
+          <a:p>
+            <a:r>
+              <a:rPr lang="en-US" b="1" dirty="0" smtClean="0"/>
+              <a:t>RESILIENT</a:t>
+            </a:r>
+          </a:p>
+          <a:p>
+            <a:r>
+              <a:rPr lang="en-US" dirty="0" smtClean="0"/>
+              <a:t>Network calls (RPC)</a:t>
+            </a:r>
+          </a:p>
+          <a:p>
+            <a:r>
+              <a:rPr lang="en-US" dirty="0" smtClean="0"/>
+              <a:t>Data inconsistency</a:t>
+            </a:r>
+          </a:p>
+          <a:p>
+            <a:r>
+              <a:rPr lang="en-US" b="1" dirty="0" smtClean="0"/>
+              <a:t>Scales well as users increase</a:t>
+            </a:r>
+            <a:endParaRPr lang="en-US" b="1" dirty="0"/>
+          </a:p>
+        </p:txBody>
+      </p:sp>
+      <p:sp>
+        <p:nvSpPr>
+          <p:cNvPr id="4" name="Content Placeholder 2"/>
+          <p:cNvSpPr txBox="1">
+            <a:spLocks/>
+          </p:cNvSpPr>
+          <p:nvPr/>
+        </p:nvSpPr>
+        <p:spPr>
+          <a:xfrm>
+            <a:off x="6378146" y="420130"/>
+            <a:ext cx="5093043" cy="5756833"/>
+          </a:xfrm>
+          <a:prstGeom prst="rect">
+            <a:avLst/>
+          </a:prstGeom>
+        </p:spPr>
+        <p:txBody>
+          <a:bodyPr vert="horz" lIns="91440" tIns="45720" rIns="91440" bIns="45720" rtlCol="0">
+            <a:normAutofit/>
+          </a:bodyPr>
+          <a:lstStyle>
+            <a:lvl1pPr marL="228600" indent="-228600" algn="l" defTabSz="914400" rtl="0" eaLnBrk="1" latinLnBrk="0" hangingPunct="1">
+              <a:lnSpc>
+                <a:spcPct val="90000"/>
+              </a:lnSpc>
+              <a:spcBef>
+                <a:spcPts val="1000"/>
+              </a:spcBef>
+              <a:buFont typeface="Arial"/>
+              <a:buChar char="•"/>
+              <a:defRPr sz="2800" kern="1200">
+                <a:solidFill>
+                  <a:schemeClr val="tx1"/>
+                </a:solidFill>
+                <a:latin typeface="+mn-lt"/>
+                <a:ea typeface="+mn-ea"/>
+                <a:cs typeface="+mn-cs"/>
+              </a:defRPr>
+            </a:lvl1pPr>
+            <a:lvl2pPr marL="685800" indent="-228600" algn="l" defTabSz="914400" rtl="0" eaLnBrk="1" latinLnBrk="0" hangingPunct="1">
+              <a:lnSpc>
+                <a:spcPct val="90000"/>
+              </a:lnSpc>
+              <a:spcBef>
+                <a:spcPts val="500"/>
+              </a:spcBef>
+              <a:buFont typeface="Arial"/>
+              <a:buChar char="•"/>
+              <a:defRPr sz="2400" kern="1200">
+                <a:solidFill>
+                  <a:schemeClr val="tx1"/>
+                </a:solidFill>
+                <a:latin typeface="+mn-lt"/>
+                <a:ea typeface="+mn-ea"/>
+                <a:cs typeface="+mn-cs"/>
+              </a:defRPr>
+            </a:lvl2pPr>
+            <a:lvl3pPr marL="1143000" indent="-228600" algn="l" defTabSz="914400" rtl="0" eaLnBrk="1" latinLnBrk="0" hangingPunct="1">
+              <a:lnSpc>
+                <a:spcPct val="90000"/>
+              </a:lnSpc>
+              <a:spcBef>
+                <a:spcPts val="500"/>
+              </a:spcBef>
+              <a:buFont typeface="Arial"/>
+              <a:buChar char="•"/>
+              <a:defRPr sz="2000" kern="1200">
+                <a:solidFill>
+                  <a:schemeClr val="tx1"/>
+                </a:solidFill>
+                <a:latin typeface="+mn-lt"/>
+                <a:ea typeface="+mn-ea"/>
+                <a:cs typeface="+mn-cs"/>
+              </a:defRPr>
+            </a:lvl3pPr>
+            <a:lvl4pPr marL="1600200" indent="-228600" algn="l" defTabSz="914400" rtl="0" eaLnBrk="1" latinLnBrk="0" hangingPunct="1">
+              <a:lnSpc>
+                <a:spcPct val="90000"/>
+              </a:lnSpc>
+              <a:spcBef>
+                <a:spcPts val="500"/>
+              </a:spcBef>
+              <a:buFont typeface="Arial"/>
+              <a:buChar char="•"/>
+              <a:defRPr sz="1800" kern="1200">
+                <a:solidFill>
+                  <a:schemeClr val="tx1"/>
+                </a:solidFill>
+                <a:latin typeface="+mn-lt"/>
+                <a:ea typeface="+mn-ea"/>
+                <a:cs typeface="+mn-cs"/>
+              </a:defRPr>
+            </a:lvl4pPr>
+            <a:lvl5pPr marL="2057400" indent="-228600" algn="l" defTabSz="914400" rtl="0" eaLnBrk="1" latinLnBrk="0" hangingPunct="1">
+              <a:lnSpc>
+                <a:spcPct val="90000"/>
+              </a:lnSpc>
+              <a:spcBef>
+                <a:spcPts val="500"/>
+              </a:spcBef>
+              <a:buFont typeface="Arial"/>
+              <a:buChar char="•"/>
+              <a:defRPr sz="1800" kern="1200">
+                <a:solidFill>
+                  <a:schemeClr val="tx1"/>
+                </a:solidFill>
+                <a:latin typeface="+mn-lt"/>
+                <a:ea typeface="+mn-ea"/>
+                <a:cs typeface="+mn-cs"/>
+              </a:defRPr>
+            </a:lvl5pPr>
+            <a:lvl6pPr marL="2514600" indent="-228600" algn="l" defTabSz="914400" rtl="0" eaLnBrk="1" latinLnBrk="0" hangingPunct="1">
+              <a:lnSpc>
+                <a:spcPct val="90000"/>
+              </a:lnSpc>
+              <a:spcBef>
+                <a:spcPts val="500"/>
+              </a:spcBef>
+              <a:buFont typeface="Arial"/>
+              <a:buChar char="•"/>
+              <a:defRPr sz="1800" kern="1200">
+                <a:solidFill>
+                  <a:schemeClr val="tx1"/>
+                </a:solidFill>
+                <a:latin typeface="+mn-lt"/>
+                <a:ea typeface="+mn-ea"/>
+                <a:cs typeface="+mn-cs"/>
+              </a:defRPr>
+            </a:lvl6pPr>
+            <a:lvl7pPr marL="2971800" indent="-228600" algn="l" defTabSz="914400" rtl="0" eaLnBrk="1" latinLnBrk="0" hangingPunct="1">
+              <a:lnSpc>
+                <a:spcPct val="90000"/>
+              </a:lnSpc>
+              <a:spcBef>
+                <a:spcPts val="500"/>
+              </a:spcBef>
+              <a:buFont typeface="Arial"/>
+              <a:buChar char="•"/>
+              <a:defRPr sz="1800" kern="1200">
+                <a:solidFill>
+                  <a:schemeClr val="tx1"/>
+                </a:solidFill>
+                <a:latin typeface="+mn-lt"/>
+                <a:ea typeface="+mn-ea"/>
+                <a:cs typeface="+mn-cs"/>
+              </a:defRPr>
+            </a:lvl7pPr>
+            <a:lvl8pPr marL="3429000" indent="-228600" algn="l" defTabSz="914400" rtl="0" eaLnBrk="1" latinLnBrk="0" hangingPunct="1">
+              <a:lnSpc>
+                <a:spcPct val="90000"/>
+              </a:lnSpc>
+              <a:spcBef>
+                <a:spcPts val="500"/>
+              </a:spcBef>
+              <a:buFont typeface="Arial"/>
+              <a:buChar char="•"/>
+              <a:defRPr sz="1800" kern="1200">
+                <a:solidFill>
+                  <a:schemeClr val="tx1"/>
+                </a:solidFill>
+                <a:latin typeface="+mn-lt"/>
+                <a:ea typeface="+mn-ea"/>
+                <a:cs typeface="+mn-cs"/>
+              </a:defRPr>
+            </a:lvl8pPr>
+            <a:lvl9pPr marL="3886200" indent="-228600" algn="l" defTabSz="914400" rtl="0" eaLnBrk="1" latinLnBrk="0" hangingPunct="1">
+              <a:lnSpc>
+                <a:spcPct val="90000"/>
+              </a:lnSpc>
+              <a:spcBef>
+                <a:spcPts val="500"/>
+              </a:spcBef>
+              <a:buFont typeface="Arial"/>
+              <a:buChar char="•"/>
+              <a:defRPr sz="1800" kern="1200">
+                <a:solidFill>
+                  <a:schemeClr val="tx1"/>
+                </a:solidFill>
+                <a:latin typeface="+mn-lt"/>
+                <a:ea typeface="+mn-ea"/>
+                <a:cs typeface="+mn-cs"/>
+              </a:defRPr>
+            </a:lvl9pPr>
+          </a:lstStyle>
+          <a:p>
+            <a:r>
+              <a:rPr lang="en-US" b="1" dirty="0" smtClean="0">
+                <a:solidFill>
+                  <a:schemeClr val="accent2"/>
+                </a:solidFill>
+              </a:rPr>
+              <a:t>Vertical Scaling</a:t>
+            </a:r>
+            <a:r>
+              <a:rPr lang="en-US" dirty="0" smtClean="0"/>
+              <a:t/>
+            </a:r>
+            <a:br>
+              <a:rPr lang="en-US" dirty="0" smtClean="0"/>
+            </a:br>
+            <a:endParaRPr lang="en-US" dirty="0" smtClean="0"/>
+          </a:p>
+          <a:p>
+            <a:r>
+              <a:rPr lang="en-US" dirty="0" smtClean="0"/>
+              <a:t>N/A</a:t>
+            </a:r>
+          </a:p>
+          <a:p>
+            <a:r>
+              <a:rPr lang="en-US" dirty="0" smtClean="0"/>
+              <a:t>Single point of failure</a:t>
+            </a:r>
+          </a:p>
+          <a:p>
+            <a:r>
+              <a:rPr lang="en-US" b="1" dirty="0" smtClean="0"/>
+              <a:t>Inter- process communications</a:t>
+            </a:r>
+          </a:p>
+          <a:p>
+            <a:r>
+              <a:rPr lang="en-US" b="1" dirty="0" smtClean="0"/>
+              <a:t>Consistent Data</a:t>
+            </a:r>
+          </a:p>
+          <a:p>
+            <a:r>
+              <a:rPr lang="en-US" dirty="0" smtClean="0"/>
+              <a:t>Hardware limit</a:t>
+            </a:r>
+            <a:endParaRPr lang="en-US" dirty="0"/>
+          </a:p>
+        </p:txBody>
+      </p:sp>
+    </p:spTree>
+    <p:extLst>
+      <p:ext uri="{BB962C8B-B14F-4D97-AF65-F5344CB8AC3E}">
+        <p14:creationId xmlns:p14="http://schemas.microsoft.com/office/powerpoint/2010/main" val="541400772"/>
+      </p:ext>
+    </p:extLst>
+  </p:cSld>
+  <p:clrMapOvr>
+    <a:masterClrMapping/>
+  </p:clrMapOvr>
+</p:sld>
+</file>
+
+<file path=ppt/slides/slide2.xml><?xml version="1.0" encoding="utf-8"?>
+<p:sld xmlns:a="http://schemas.openxmlformats.org/drawingml/2006/main" xmlns:r="http://schemas.openxmlformats.org/officeDocument/2006/relationships" xmlns:p="http://schemas.openxmlformats.org/presentationml/2006/main">
+  <p:cSld>
+    <p:spTree>
+      <p:nvGrpSpPr>
+        <p:cNvPr id="1" name=""/>
+        <p:cNvGrpSpPr/>
+        <p:nvPr/>
+      </p:nvGrpSpPr>
+      <p:grpSpPr>
+        <a:xfrm>
+          <a:off x="0" y="0"/>
+          <a:ext cx="0" cy="0"/>
+          <a:chOff x="0" y="0"/>
+          <a:chExt cx="0" cy="0"/>
+        </a:xfrm>
+      </p:grpSpPr>
+      <p:sp>
+        <p:nvSpPr>
+          <p:cNvPr id="4" name="Rectangle 3"/>
+          <p:cNvSpPr/>
+          <p:nvPr/>
+        </p:nvSpPr>
+        <p:spPr>
+          <a:xfrm>
+            <a:off x="4550987" y="0"/>
+            <a:ext cx="3111054" cy="523220"/>
+          </a:xfrm>
+          <a:prstGeom prst="rect">
+            <a:avLst/>
+          </a:prstGeom>
+          <a:noFill/>
+        </p:spPr>
+        <p:txBody>
+          <a:bodyPr wrap="square" lIns="91440" tIns="45720" rIns="91440" bIns="45720">
+            <a:spAutoFit/>
+          </a:bodyPr>
+          <a:lstStyle/>
+          <a:p>
+            <a:pPr algn="ctr"/>
+            <a:r>
+              <a:rPr lang="en-US" sz="2800" b="0" cap="none" spc="0" dirty="0" smtClean="0">
+                <a:ln w="0"/>
+                <a:solidFill>
+                  <a:schemeClr val="accent2"/>
+                </a:solidFill>
+                <a:effectLst>
+                  <a:outerShdw blurRad="38100" dist="19050" dir="2700000" algn="tl" rotWithShape="0">
+                    <a:schemeClr val="dk1">
+                      <a:alpha val="40000"/>
+                    </a:schemeClr>
+                  </a:outerShdw>
+                </a:effectLst>
+              </a:rPr>
+              <a:t>Consistent Hashing</a:t>
+            </a:r>
+            <a:endParaRPr lang="en-US" sz="5400" b="0" cap="none" spc="0" dirty="0">
+              <a:ln w="0"/>
+              <a:solidFill>
+                <a:schemeClr val="accent2"/>
+              </a:solidFill>
+              <a:effectLst>
+                <a:outerShdw blurRad="38100" dist="19050" dir="2700000" algn="tl" rotWithShape="0">
+                  <a:schemeClr val="dk1">
+                    <a:alpha val="40000"/>
+                  </a:schemeClr>
+                </a:outerShdw>
+              </a:effectLst>
+            </a:endParaRPr>
+          </a:p>
+        </p:txBody>
+      </p:sp>
+      <p:sp>
+        <p:nvSpPr>
+          <p:cNvPr id="5" name="Oval 4"/>
+          <p:cNvSpPr/>
+          <p:nvPr/>
+        </p:nvSpPr>
+        <p:spPr>
+          <a:xfrm>
+            <a:off x="1050324" y="1173892"/>
+            <a:ext cx="4077730" cy="3731740"/>
+          </a:xfrm>
+          <a:prstGeom prst="ellipse">
+            <a:avLst/>
+          </a:prstGeom>
+          <a:noFill/>
+        </p:spPr>
+        <p:style>
+          <a:lnRef idx="2">
+            <a:schemeClr val="accent1">
+              <a:shade val="50000"/>
+            </a:schemeClr>
+          </a:lnRef>
+          <a:fillRef idx="1">
+            <a:schemeClr val="accent1"/>
+          </a:fillRef>
+          <a:effectRef idx="0">
+            <a:schemeClr val="accent1"/>
+          </a:effectRef>
+          <a:fontRef idx="minor">
+            <a:schemeClr val="lt1"/>
+          </a:fontRef>
+        </p:style>
+        <p:txBody>
+          <a:bodyPr rtlCol="0" anchor="ctr"/>
+          <a:lstStyle/>
+          <a:p>
+            <a:pPr algn="ctr"/>
+            <a:endParaRPr lang="en-US"/>
+          </a:p>
+        </p:txBody>
+      </p:sp>
+      <p:sp>
+        <p:nvSpPr>
+          <p:cNvPr id="6" name="Oval 5"/>
+          <p:cNvSpPr/>
+          <p:nvPr/>
+        </p:nvSpPr>
+        <p:spPr>
+          <a:xfrm>
+            <a:off x="1682578" y="1694935"/>
+            <a:ext cx="2813222" cy="2689654"/>
+          </a:xfrm>
+          <a:prstGeom prst="ellipse">
+            <a:avLst/>
+          </a:prstGeom>
+          <a:noFill/>
+        </p:spPr>
+        <p:style>
+          <a:lnRef idx="2">
+            <a:schemeClr val="accent1">
+              <a:shade val="50000"/>
+            </a:schemeClr>
+          </a:lnRef>
+          <a:fillRef idx="1">
+            <a:schemeClr val="accent1"/>
+          </a:fillRef>
+          <a:effectRef idx="0">
+            <a:schemeClr val="accent1"/>
+          </a:effectRef>
+          <a:fontRef idx="minor">
+            <a:schemeClr val="lt1"/>
+          </a:fontRef>
+        </p:style>
+        <p:txBody>
+          <a:bodyPr rtlCol="0" anchor="ctr"/>
+          <a:lstStyle/>
+          <a:p>
+            <a:pPr algn="ctr"/>
+            <a:endParaRPr lang="en-US"/>
+          </a:p>
+        </p:txBody>
+      </p:sp>
+      <p:sp>
+        <p:nvSpPr>
+          <p:cNvPr id="7" name="TextBox 6"/>
           <p:cNvSpPr txBox="1"/>
           <p:nvPr/>
         </p:nvSpPr>
         <p:spPr>
           <a:xfrm>
-            <a:off x="469131" y="873069"/>
-            <a:ext cx="1136822" cy="646331"/>
+            <a:off x="549519" y="527561"/>
+            <a:ext cx="2020685" cy="369332"/>
+          </a:xfrm>
+          <a:prstGeom prst="rect">
+            <a:avLst/>
+          </a:prstGeom>
+          <a:noFill/>
+          <a:ln>
+            <a:noFill/>
+          </a:ln>
+        </p:spPr>
+        <p:txBody>
+          <a:bodyPr wrap="square" rtlCol="0">
+            <a:spAutoFit/>
+          </a:bodyPr>
+          <a:lstStyle/>
+          <a:p>
+            <a:r>
+              <a:rPr lang="en-US" dirty="0" smtClean="0"/>
+              <a:t>Request Id -&gt;  h(r1)</a:t>
+            </a:r>
+            <a:endParaRPr lang="en-US" dirty="0"/>
+          </a:p>
+        </p:txBody>
+      </p:sp>
+      <p:sp>
+        <p:nvSpPr>
+          <p:cNvPr id="8" name="TextBox 7"/>
+          <p:cNvSpPr txBox="1"/>
+          <p:nvPr/>
+        </p:nvSpPr>
+        <p:spPr>
+          <a:xfrm>
+            <a:off x="5760308" y="989226"/>
+            <a:ext cx="1136822" cy="369332"/>
           </a:xfrm>
           <a:prstGeom prst="rect">
             <a:avLst/>
@@ -2998,24 +3508,712 @@
           <a:p>
             <a:r>
               <a:rPr lang="en-US" dirty="0" smtClean="0"/>
-              <a:t>Client 1</a:t>
-            </a:r>
-          </a:p>
-          <a:p>
+              <a:t>Server 0</a:t>
+            </a:r>
             <a:endParaRPr lang="en-US" dirty="0"/>
           </a:p>
         </p:txBody>
       </p:sp>
       <p:sp>
         <p:nvSpPr>
-          <p:cNvPr id="5" name="Rectangle 4"/>
+          <p:cNvPr id="10" name="TextBox 9"/>
+          <p:cNvSpPr txBox="1"/>
+          <p:nvPr/>
+        </p:nvSpPr>
+        <p:spPr>
+          <a:xfrm>
+            <a:off x="5760308" y="1787268"/>
+            <a:ext cx="1136822" cy="369332"/>
+          </a:xfrm>
+          <a:prstGeom prst="rect">
+            <a:avLst/>
+          </a:prstGeom>
+          <a:noFill/>
+          <a:ln>
+            <a:solidFill>
+              <a:schemeClr val="accent1"/>
+            </a:solidFill>
+          </a:ln>
+        </p:spPr>
+        <p:txBody>
+          <a:bodyPr wrap="square" rtlCol="0">
+            <a:spAutoFit/>
+          </a:bodyPr>
+          <a:lstStyle/>
+          <a:p>
+            <a:r>
+              <a:rPr lang="en-US" dirty="0" smtClean="0"/>
+              <a:t>Server 1</a:t>
+            </a:r>
+            <a:endParaRPr lang="en-US" dirty="0"/>
+          </a:p>
+        </p:txBody>
+      </p:sp>
+      <p:sp>
+        <p:nvSpPr>
+          <p:cNvPr id="11" name="TextBox 10"/>
+          <p:cNvSpPr txBox="1"/>
+          <p:nvPr/>
+        </p:nvSpPr>
+        <p:spPr>
+          <a:xfrm>
+            <a:off x="5760308" y="2744571"/>
+            <a:ext cx="1136822" cy="369332"/>
+          </a:xfrm>
+          <a:prstGeom prst="rect">
+            <a:avLst/>
+          </a:prstGeom>
+          <a:noFill/>
+          <a:ln>
+            <a:solidFill>
+              <a:schemeClr val="accent1"/>
+            </a:solidFill>
+          </a:ln>
+        </p:spPr>
+        <p:txBody>
+          <a:bodyPr wrap="square" rtlCol="0">
+            <a:spAutoFit/>
+          </a:bodyPr>
+          <a:lstStyle/>
+          <a:p>
+            <a:r>
+              <a:rPr lang="en-US" dirty="0" smtClean="0"/>
+              <a:t>Server 2</a:t>
+            </a:r>
+            <a:endParaRPr lang="en-US" dirty="0"/>
+          </a:p>
+        </p:txBody>
+      </p:sp>
+      <p:sp>
+        <p:nvSpPr>
+          <p:cNvPr id="12" name="TextBox 11"/>
+          <p:cNvSpPr txBox="1"/>
+          <p:nvPr/>
+        </p:nvSpPr>
+        <p:spPr>
+          <a:xfrm>
+            <a:off x="5760308" y="3701874"/>
+            <a:ext cx="1136822" cy="369332"/>
+          </a:xfrm>
+          <a:prstGeom prst="rect">
+            <a:avLst/>
+          </a:prstGeom>
+          <a:noFill/>
+          <a:ln>
+            <a:solidFill>
+              <a:schemeClr val="accent1"/>
+            </a:solidFill>
+          </a:ln>
+        </p:spPr>
+        <p:txBody>
+          <a:bodyPr wrap="square" rtlCol="0">
+            <a:spAutoFit/>
+          </a:bodyPr>
+          <a:lstStyle/>
+          <a:p>
+            <a:r>
+              <a:rPr lang="en-US" smtClean="0"/>
+              <a:t>Server 3</a:t>
+            </a:r>
+            <a:endParaRPr lang="en-US" dirty="0"/>
+          </a:p>
+        </p:txBody>
+      </p:sp>
+      <p:sp>
+        <p:nvSpPr>
+          <p:cNvPr id="13" name="TextBox 12"/>
+          <p:cNvSpPr txBox="1"/>
+          <p:nvPr/>
+        </p:nvSpPr>
+        <p:spPr>
+          <a:xfrm>
+            <a:off x="5760308" y="4628633"/>
+            <a:ext cx="1136822" cy="369332"/>
+          </a:xfrm>
+          <a:prstGeom prst="rect">
+            <a:avLst/>
+          </a:prstGeom>
+          <a:noFill/>
+          <a:ln>
+            <a:solidFill>
+              <a:schemeClr val="accent1"/>
+            </a:solidFill>
+          </a:ln>
+        </p:spPr>
+        <p:txBody>
+          <a:bodyPr wrap="square" rtlCol="0">
+            <a:spAutoFit/>
+          </a:bodyPr>
+          <a:lstStyle/>
+          <a:p>
+            <a:r>
+              <a:rPr lang="en-US" dirty="0" smtClean="0"/>
+              <a:t>Server M</a:t>
+            </a:r>
+            <a:endParaRPr lang="en-US" dirty="0"/>
+          </a:p>
+        </p:txBody>
+      </p:sp>
+      <p:sp>
+        <p:nvSpPr>
+          <p:cNvPr id="14" name="TextBox 13"/>
+          <p:cNvSpPr txBox="1"/>
+          <p:nvPr/>
+        </p:nvSpPr>
+        <p:spPr>
+          <a:xfrm>
+            <a:off x="7662041" y="970578"/>
+            <a:ext cx="1348510" cy="369332"/>
+          </a:xfrm>
+          <a:prstGeom prst="rect">
+            <a:avLst/>
+          </a:prstGeom>
+          <a:noFill/>
+          <a:ln>
+            <a:noFill/>
+          </a:ln>
+        </p:spPr>
+        <p:txBody>
+          <a:bodyPr wrap="square" rtlCol="0">
+            <a:spAutoFit/>
+          </a:bodyPr>
+          <a:lstStyle/>
+          <a:p>
+            <a:r>
+              <a:rPr lang="en-US" dirty="0" smtClean="0"/>
+              <a:t>h1(0) % M</a:t>
+            </a:r>
+            <a:endParaRPr lang="en-US" dirty="0"/>
+          </a:p>
+        </p:txBody>
+      </p:sp>
+      <p:sp>
+        <p:nvSpPr>
+          <p:cNvPr id="15" name="TextBox 14"/>
+          <p:cNvSpPr txBox="1"/>
+          <p:nvPr/>
+        </p:nvSpPr>
+        <p:spPr>
+          <a:xfrm>
+            <a:off x="3270421" y="1310276"/>
+            <a:ext cx="459260" cy="369332"/>
+          </a:xfrm>
+          <a:prstGeom prst="rect">
+            <a:avLst/>
+          </a:prstGeom>
+          <a:noFill/>
+          <a:ln>
+            <a:solidFill>
+              <a:schemeClr val="accent1"/>
+            </a:solidFill>
+          </a:ln>
+        </p:spPr>
+        <p:txBody>
+          <a:bodyPr wrap="square" rtlCol="0">
+            <a:spAutoFit/>
+          </a:bodyPr>
+          <a:lstStyle/>
+          <a:p>
+            <a:r>
+              <a:rPr lang="en-US" smtClean="0"/>
+              <a:t>S0</a:t>
+            </a:r>
+            <a:endParaRPr lang="en-US" dirty="0"/>
+          </a:p>
+        </p:txBody>
+      </p:sp>
+      <p:sp>
+        <p:nvSpPr>
+          <p:cNvPr id="16" name="TextBox 15"/>
+          <p:cNvSpPr txBox="1"/>
+          <p:nvPr/>
+        </p:nvSpPr>
+        <p:spPr>
+          <a:xfrm>
+            <a:off x="4550987" y="2694628"/>
+            <a:ext cx="459260" cy="369332"/>
+          </a:xfrm>
+          <a:prstGeom prst="rect">
+            <a:avLst/>
+          </a:prstGeom>
+          <a:noFill/>
+          <a:ln>
+            <a:solidFill>
+              <a:schemeClr val="accent1"/>
+            </a:solidFill>
+          </a:ln>
+        </p:spPr>
+        <p:txBody>
+          <a:bodyPr wrap="square" rtlCol="0">
+            <a:spAutoFit/>
+          </a:bodyPr>
+          <a:lstStyle/>
+          <a:p>
+            <a:r>
+              <a:rPr lang="en-US" smtClean="0"/>
+              <a:t>S1</a:t>
+            </a:r>
+            <a:endParaRPr lang="en-US" dirty="0"/>
+          </a:p>
+        </p:txBody>
+      </p:sp>
+      <p:sp>
+        <p:nvSpPr>
+          <p:cNvPr id="17" name="TextBox 16"/>
+          <p:cNvSpPr txBox="1"/>
+          <p:nvPr/>
+        </p:nvSpPr>
+        <p:spPr>
+          <a:xfrm>
+            <a:off x="3729681" y="4199923"/>
+            <a:ext cx="459260" cy="369332"/>
+          </a:xfrm>
+          <a:prstGeom prst="rect">
+            <a:avLst/>
+          </a:prstGeom>
+          <a:noFill/>
+          <a:ln>
+            <a:solidFill>
+              <a:schemeClr val="accent1"/>
+            </a:solidFill>
+          </a:ln>
+        </p:spPr>
+        <p:txBody>
+          <a:bodyPr wrap="square" rtlCol="0">
+            <a:spAutoFit/>
+          </a:bodyPr>
+          <a:lstStyle/>
+          <a:p>
+            <a:r>
+              <a:rPr lang="en-US" dirty="0" smtClean="0"/>
+              <a:t>S2</a:t>
+            </a:r>
+            <a:endParaRPr lang="en-US" dirty="0"/>
+          </a:p>
+        </p:txBody>
+      </p:sp>
+      <p:sp>
+        <p:nvSpPr>
+          <p:cNvPr id="18" name="TextBox 17"/>
+          <p:cNvSpPr txBox="1"/>
+          <p:nvPr/>
+        </p:nvSpPr>
+        <p:spPr>
+          <a:xfrm>
+            <a:off x="1930743" y="4199923"/>
+            <a:ext cx="459260" cy="369332"/>
+          </a:xfrm>
+          <a:prstGeom prst="rect">
+            <a:avLst/>
+          </a:prstGeom>
+          <a:noFill/>
+          <a:ln>
+            <a:solidFill>
+              <a:schemeClr val="accent1"/>
+            </a:solidFill>
+          </a:ln>
+        </p:spPr>
+        <p:txBody>
+          <a:bodyPr wrap="square" rtlCol="0">
+            <a:spAutoFit/>
+          </a:bodyPr>
+          <a:lstStyle/>
+          <a:p>
+            <a:r>
+              <a:rPr lang="en-US" smtClean="0"/>
+              <a:t>S3</a:t>
+            </a:r>
+            <a:endParaRPr lang="en-US" dirty="0"/>
+          </a:p>
+        </p:txBody>
+      </p:sp>
+      <p:sp>
+        <p:nvSpPr>
+          <p:cNvPr id="19" name="TextBox 18"/>
+          <p:cNvSpPr txBox="1"/>
+          <p:nvPr/>
+        </p:nvSpPr>
+        <p:spPr>
+          <a:xfrm>
+            <a:off x="1148566" y="2596630"/>
+            <a:ext cx="534012" cy="369332"/>
+          </a:xfrm>
+          <a:prstGeom prst="rect">
+            <a:avLst/>
+          </a:prstGeom>
+          <a:noFill/>
+          <a:ln>
+            <a:solidFill>
+              <a:schemeClr val="accent1"/>
+            </a:solidFill>
+          </a:ln>
+        </p:spPr>
+        <p:txBody>
+          <a:bodyPr wrap="square" rtlCol="0">
+            <a:spAutoFit/>
+          </a:bodyPr>
+          <a:lstStyle/>
+          <a:p>
+            <a:r>
+              <a:rPr lang="en-US" smtClean="0"/>
+              <a:t>SM</a:t>
+            </a:r>
+            <a:endParaRPr lang="en-US" dirty="0"/>
+          </a:p>
+        </p:txBody>
+      </p:sp>
+      <p:sp>
+        <p:nvSpPr>
+          <p:cNvPr id="20" name="TextBox 19"/>
+          <p:cNvSpPr txBox="1"/>
+          <p:nvPr/>
+        </p:nvSpPr>
+        <p:spPr>
+          <a:xfrm>
+            <a:off x="1930743" y="1477435"/>
+            <a:ext cx="459260" cy="369332"/>
+          </a:xfrm>
+          <a:prstGeom prst="rect">
+            <a:avLst/>
+          </a:prstGeom>
+          <a:noFill/>
+          <a:ln>
+            <a:solidFill>
+              <a:schemeClr val="accent1"/>
+            </a:solidFill>
+          </a:ln>
+        </p:spPr>
+        <p:txBody>
+          <a:bodyPr wrap="square" rtlCol="0">
+            <a:spAutoFit/>
+          </a:bodyPr>
+          <a:lstStyle/>
+          <a:p>
+            <a:endParaRPr lang="en-US" dirty="0"/>
+          </a:p>
+        </p:txBody>
+      </p:sp>
+      <p:sp>
+        <p:nvSpPr>
+          <p:cNvPr id="21" name="TextBox 20"/>
+          <p:cNvSpPr txBox="1"/>
+          <p:nvPr/>
+        </p:nvSpPr>
+        <p:spPr>
+          <a:xfrm>
+            <a:off x="4123037" y="1701231"/>
+            <a:ext cx="459260" cy="369332"/>
+          </a:xfrm>
+          <a:prstGeom prst="rect">
+            <a:avLst/>
+          </a:prstGeom>
+          <a:noFill/>
+          <a:ln>
+            <a:solidFill>
+              <a:schemeClr val="accent1"/>
+            </a:solidFill>
+          </a:ln>
+        </p:spPr>
+        <p:txBody>
+          <a:bodyPr wrap="square" rtlCol="0">
+            <a:spAutoFit/>
+          </a:bodyPr>
+          <a:lstStyle/>
+          <a:p>
+            <a:endParaRPr lang="en-US" dirty="0"/>
+          </a:p>
+        </p:txBody>
+      </p:sp>
+      <p:sp>
+        <p:nvSpPr>
+          <p:cNvPr id="22" name="TextBox 21"/>
+          <p:cNvSpPr txBox="1"/>
+          <p:nvPr/>
+        </p:nvSpPr>
+        <p:spPr>
+          <a:xfrm>
+            <a:off x="7662041" y="1633381"/>
+            <a:ext cx="1348510" cy="369332"/>
+          </a:xfrm>
+          <a:prstGeom prst="rect">
+            <a:avLst/>
+          </a:prstGeom>
+          <a:noFill/>
+          <a:ln>
+            <a:noFill/>
+          </a:ln>
+        </p:spPr>
+        <p:txBody>
+          <a:bodyPr wrap="square" rtlCol="0">
+            <a:spAutoFit/>
+          </a:bodyPr>
+          <a:lstStyle/>
+          <a:p>
+            <a:r>
+              <a:rPr lang="en-US" dirty="0" smtClean="0"/>
+              <a:t>H1(1) % M</a:t>
+            </a:r>
+            <a:endParaRPr lang="en-US" dirty="0"/>
+          </a:p>
+        </p:txBody>
+      </p:sp>
+      <p:sp>
+        <p:nvSpPr>
+          <p:cNvPr id="23" name="TextBox 22"/>
+          <p:cNvSpPr txBox="1"/>
+          <p:nvPr/>
+        </p:nvSpPr>
+        <p:spPr>
+          <a:xfrm>
+            <a:off x="7662041" y="2670430"/>
+            <a:ext cx="1348510" cy="369332"/>
+          </a:xfrm>
+          <a:prstGeom prst="rect">
+            <a:avLst/>
+          </a:prstGeom>
+          <a:noFill/>
+          <a:ln>
+            <a:noFill/>
+          </a:ln>
+        </p:spPr>
+        <p:txBody>
+          <a:bodyPr wrap="square" rtlCol="0">
+            <a:spAutoFit/>
+          </a:bodyPr>
+          <a:lstStyle/>
+          <a:p>
+            <a:r>
+              <a:rPr lang="en-US" dirty="0" smtClean="0"/>
+              <a:t>H1(2) % M</a:t>
+            </a:r>
+            <a:endParaRPr lang="en-US" dirty="0"/>
+          </a:p>
+        </p:txBody>
+      </p:sp>
+      <p:sp>
+        <p:nvSpPr>
+          <p:cNvPr id="24" name="TextBox 23"/>
+          <p:cNvSpPr txBox="1"/>
+          <p:nvPr/>
+        </p:nvSpPr>
+        <p:spPr>
+          <a:xfrm>
+            <a:off x="7662041" y="3701874"/>
+            <a:ext cx="1348510" cy="369332"/>
+          </a:xfrm>
+          <a:prstGeom prst="rect">
+            <a:avLst/>
+          </a:prstGeom>
+          <a:noFill/>
+          <a:ln>
+            <a:noFill/>
+          </a:ln>
+        </p:spPr>
+        <p:txBody>
+          <a:bodyPr wrap="square" rtlCol="0">
+            <a:spAutoFit/>
+          </a:bodyPr>
+          <a:lstStyle/>
+          <a:p>
+            <a:r>
+              <a:rPr lang="en-US" dirty="0" smtClean="0"/>
+              <a:t>H1(3) % M</a:t>
+            </a:r>
+            <a:endParaRPr lang="en-US" dirty="0"/>
+          </a:p>
+        </p:txBody>
+      </p:sp>
+      <p:sp>
+        <p:nvSpPr>
+          <p:cNvPr id="25" name="TextBox 24"/>
+          <p:cNvSpPr txBox="1"/>
+          <p:nvPr/>
+        </p:nvSpPr>
+        <p:spPr>
+          <a:xfrm>
+            <a:off x="7662041" y="4548652"/>
+            <a:ext cx="1348510" cy="369332"/>
+          </a:xfrm>
+          <a:prstGeom prst="rect">
+            <a:avLst/>
+          </a:prstGeom>
+          <a:noFill/>
+          <a:ln>
+            <a:noFill/>
+          </a:ln>
+        </p:spPr>
+        <p:txBody>
+          <a:bodyPr wrap="square" rtlCol="0">
+            <a:spAutoFit/>
+          </a:bodyPr>
+          <a:lstStyle/>
+          <a:p>
+            <a:r>
+              <a:rPr lang="en-US" dirty="0" smtClean="0"/>
+              <a:t>H1(M) % M</a:t>
+            </a:r>
+            <a:endParaRPr lang="en-US" dirty="0"/>
+          </a:p>
+        </p:txBody>
+      </p:sp>
+      <p:sp>
+        <p:nvSpPr>
+          <p:cNvPr id="26" name="TextBox 25"/>
+          <p:cNvSpPr txBox="1"/>
+          <p:nvPr/>
+        </p:nvSpPr>
+        <p:spPr>
+          <a:xfrm>
+            <a:off x="9425789" y="881161"/>
+            <a:ext cx="2547908" cy="3416320"/>
+          </a:xfrm>
+          <a:prstGeom prst="rect">
+            <a:avLst/>
+          </a:prstGeom>
+          <a:noFill/>
+          <a:ln>
+            <a:noFill/>
+          </a:ln>
+        </p:spPr>
+        <p:txBody>
+          <a:bodyPr wrap="square" rtlCol="0">
+            <a:spAutoFit/>
+          </a:bodyPr>
+          <a:lstStyle/>
+          <a:p>
+            <a:pPr marL="285750" indent="-285750">
+              <a:buFont typeface="Arial" charset="0"/>
+              <a:buChar char="•"/>
+            </a:pPr>
+            <a:r>
+              <a:rPr lang="en-US" dirty="0" smtClean="0"/>
+              <a:t>Assign server to positions</a:t>
+            </a:r>
+          </a:p>
+          <a:p>
+            <a:pPr marL="285750" indent="-285750">
+              <a:buFont typeface="Arial" charset="0"/>
+              <a:buChar char="•"/>
+            </a:pPr>
+            <a:r>
+              <a:rPr lang="en-US" dirty="0" smtClean="0"/>
+              <a:t>Hash request ID, and find closest server</a:t>
+            </a:r>
+          </a:p>
+          <a:p>
+            <a:pPr marL="285750" indent="-285750">
+              <a:buFont typeface="Arial" charset="0"/>
+              <a:buChar char="•"/>
+            </a:pPr>
+            <a:r>
+              <a:rPr lang="en-US" dirty="0" smtClean="0"/>
+              <a:t>2</a:t>
+            </a:r>
+            <a:r>
+              <a:rPr lang="en-US" baseline="30000" dirty="0" smtClean="0"/>
+              <a:t>nd</a:t>
+            </a:r>
+            <a:r>
+              <a:rPr lang="en-US" dirty="0" smtClean="0"/>
+              <a:t> hash table, taking into account virtual servers, to load balance equally</a:t>
+            </a:r>
+          </a:p>
+          <a:p>
+            <a:pPr marL="285750" indent="-285750">
+              <a:buFont typeface="Arial" charset="0"/>
+              <a:buChar char="•"/>
+            </a:pPr>
+            <a:r>
+              <a:rPr lang="en-US" dirty="0" smtClean="0"/>
+              <a:t>Each servers maps to multiple points</a:t>
+            </a:r>
+          </a:p>
+          <a:p>
+            <a:pPr marL="285750" indent="-285750">
+              <a:buFont typeface="Arial" charset="0"/>
+              <a:buChar char="•"/>
+            </a:pPr>
+            <a:r>
+              <a:rPr lang="en-US" dirty="0" smtClean="0"/>
+              <a:t>Works well only when many servers</a:t>
+            </a:r>
+            <a:endParaRPr lang="en-US" dirty="0"/>
+          </a:p>
+        </p:txBody>
+      </p:sp>
+      <p:sp>
+        <p:nvSpPr>
+          <p:cNvPr id="27" name="TextBox 26"/>
+          <p:cNvSpPr txBox="1"/>
+          <p:nvPr/>
+        </p:nvSpPr>
+        <p:spPr>
+          <a:xfrm>
+            <a:off x="3959311" y="689466"/>
+            <a:ext cx="773327" cy="369332"/>
+          </a:xfrm>
+          <a:prstGeom prst="rect">
+            <a:avLst/>
+          </a:prstGeom>
+          <a:noFill/>
+          <a:ln>
+            <a:noFill/>
+          </a:ln>
+        </p:spPr>
+        <p:txBody>
+          <a:bodyPr wrap="square" rtlCol="0">
+            <a:spAutoFit/>
+          </a:bodyPr>
+          <a:lstStyle/>
+          <a:p>
+            <a:r>
+              <a:rPr lang="en-US" dirty="0" smtClean="0"/>
+              <a:t>1 / M</a:t>
+            </a:r>
+            <a:endParaRPr lang="en-US" dirty="0"/>
+          </a:p>
+        </p:txBody>
+      </p:sp>
+    </p:spTree>
+    <p:extLst>
+      <p:ext uri="{BB962C8B-B14F-4D97-AF65-F5344CB8AC3E}">
+        <p14:creationId xmlns:p14="http://schemas.microsoft.com/office/powerpoint/2010/main" val="1987476536"/>
+      </p:ext>
+    </p:extLst>
+  </p:cSld>
+  <p:clrMapOvr>
+    <a:masterClrMapping/>
+  </p:clrMapOvr>
+</p:sld>
+</file>
+
+<file path=ppt/slides/slide3.xml><?xml version="1.0" encoding="utf-8"?>
+<p:sld xmlns:a="http://schemas.openxmlformats.org/drawingml/2006/main" xmlns:r="http://schemas.openxmlformats.org/officeDocument/2006/relationships" xmlns:p="http://schemas.openxmlformats.org/presentationml/2006/main">
+  <p:cSld>
+    <p:spTree>
+      <p:nvGrpSpPr>
+        <p:cNvPr id="1" name=""/>
+        <p:cNvGrpSpPr/>
+        <p:nvPr/>
+      </p:nvGrpSpPr>
+      <p:grpSpPr>
+        <a:xfrm>
+          <a:off x="0" y="0"/>
+          <a:ext cx="0" cy="0"/>
+          <a:chOff x="0" y="0"/>
+          <a:chExt cx="0" cy="0"/>
+        </a:xfrm>
+      </p:grpSpPr>
+      <p:sp>
+        <p:nvSpPr>
+          <p:cNvPr id="4" name="Rectangle 3"/>
           <p:cNvSpPr/>
           <p:nvPr/>
         </p:nvSpPr>
         <p:spPr>
           <a:xfrm>
             <a:off x="4550987" y="0"/>
-            <a:ext cx="3111054" cy="523220"/>
+            <a:ext cx="3604472" cy="523220"/>
           </a:xfrm>
           <a:prstGeom prst="rect">
             <a:avLst/>
@@ -3043,7 +4241,23 @@
                   </a:outerShdw>
                 </a:effectLst>
               </a:rPr>
-              <a:t>WhatsApp</a:t>
+              <a:t>Message/ Task </a:t>
+            </a:r>
+            <a:r>
+              <a:rPr lang="en-US" sz="2800" b="0" cap="none" spc="0" dirty="0" smtClean="0">
+                <a:ln w="0"/>
+                <a:solidFill>
+                  <a:schemeClr val="accent2"/>
+                </a:solidFill>
+                <a:effectLst>
+                  <a:outerShdw blurRad="38100" dist="19050" dir="2700000" algn="tl" rotWithShape="0">
+                    <a:schemeClr val="dk1">
+                      <a:alpha val="40000"/>
+                    </a:schemeClr>
+                  </a:outerShdw>
+                </a:effectLst>
+              </a:rPr>
+              <a:t>Queues</a:t>
             </a:r>
             <a:endParaRPr lang="en-US" sz="5400" b="0" cap="none" spc="0" dirty="0">
               <a:ln w="0"/>
@@ -3063,14 +4277,14 @@
       </p:sp>
       <p:sp>
         <p:nvSpPr>
-          <p:cNvPr id="6" name="TextBox 5"/>
+          <p:cNvPr id="3" name="TextBox 2"/>
           <p:cNvSpPr txBox="1"/>
           <p:nvPr/>
         </p:nvSpPr>
         <p:spPr>
           <a:xfrm>
-            <a:off x="451236" y="1719151"/>
-            <a:ext cx="1136822" cy="646331"/>
+            <a:off x="2542918" y="847039"/>
+            <a:ext cx="1136822" cy="369332"/>
           </a:xfrm>
           <a:prstGeom prst="rect">
             <a:avLst/>
@@ -3090,24 +4304,22 @@
           <a:p>
             <a:r>
               <a:rPr lang="en-US" dirty="0" smtClean="0"/>
-              <a:t>Client 2</a:t>
-            </a:r>
-          </a:p>
-          <a:p>
+              <a:t>Server 0</a:t>
+            </a:r>
             <a:endParaRPr lang="en-US" dirty="0"/>
           </a:p>
         </p:txBody>
       </p:sp>
       <p:sp>
         <p:nvSpPr>
-          <p:cNvPr id="7" name="TextBox 6"/>
+          <p:cNvPr id="5" name="TextBox 4"/>
           <p:cNvSpPr txBox="1"/>
           <p:nvPr/>
         </p:nvSpPr>
         <p:spPr>
           <a:xfrm>
-            <a:off x="449106" y="2565233"/>
-            <a:ext cx="1136822" cy="646331"/>
+            <a:off x="2542918" y="1645081"/>
+            <a:ext cx="1136822" cy="369332"/>
           </a:xfrm>
           <a:prstGeom prst="rect">
             <a:avLst/>
@@ -3127,24 +4339,22 @@
           <a:p>
             <a:r>
               <a:rPr lang="en-US" dirty="0" smtClean="0"/>
-              <a:t>Client 3</a:t>
-            </a:r>
-          </a:p>
-          <a:p>
+              <a:t>Server 1</a:t>
+            </a:r>
             <a:endParaRPr lang="en-US" dirty="0"/>
           </a:p>
         </p:txBody>
       </p:sp>
       <p:sp>
         <p:nvSpPr>
-          <p:cNvPr id="8" name="TextBox 7"/>
+          <p:cNvPr id="6" name="TextBox 5"/>
           <p:cNvSpPr txBox="1"/>
           <p:nvPr/>
         </p:nvSpPr>
         <p:spPr>
           <a:xfrm>
-            <a:off x="449106" y="3411315"/>
-            <a:ext cx="1136822" cy="646331"/>
+            <a:off x="2542918" y="2602384"/>
+            <a:ext cx="1136822" cy="369332"/>
           </a:xfrm>
           <a:prstGeom prst="rect">
             <a:avLst/>
@@ -3164,24 +4374,22 @@
           <a:p>
             <a:r>
               <a:rPr lang="en-US" dirty="0" smtClean="0"/>
-              <a:t>Client 4</a:t>
-            </a:r>
-          </a:p>
-          <a:p>
+              <a:t>Server 2</a:t>
+            </a:r>
             <a:endParaRPr lang="en-US" dirty="0"/>
           </a:p>
         </p:txBody>
       </p:sp>
       <p:sp>
         <p:nvSpPr>
-          <p:cNvPr id="9" name="TextBox 8"/>
+          <p:cNvPr id="7" name="TextBox 6"/>
           <p:cNvSpPr txBox="1"/>
           <p:nvPr/>
         </p:nvSpPr>
         <p:spPr>
           <a:xfrm>
-            <a:off x="449106" y="4257397"/>
-            <a:ext cx="1136822" cy="646331"/>
+            <a:off x="2542918" y="3559687"/>
+            <a:ext cx="1136822" cy="369332"/>
           </a:xfrm>
           <a:prstGeom prst="rect">
             <a:avLst/>
@@ -3200,25 +4408,594 @@
           <a:lstStyle/>
           <a:p>
             <a:r>
-              <a:rPr lang="en-US" dirty="0" smtClean="0"/>
-              <a:t>Client 5</a:t>
-            </a:r>
-          </a:p>
-          <a:p>
+              <a:rPr lang="en-US" smtClean="0"/>
+              <a:t>Server 3</a:t>
+            </a:r>
             <a:endParaRPr lang="en-US" dirty="0"/>
           </a:p>
         </p:txBody>
       </p:sp>
-      <p:sp>
-        <p:nvSpPr>
-          <p:cNvPr id="11" name="TextBox 10"/>
+      <p:graphicFrame>
+        <p:nvGraphicFramePr>
+          <p:cNvPr id="2" name="Table 1"/>
+          <p:cNvGraphicFramePr>
+            <a:graphicFrameLocks noGrp="1"/>
+          </p:cNvGraphicFramePr>
+          <p:nvPr>
+            <p:extLst>
+              <p:ext uri="{D42A27DB-BD31-4B8C-83A1-F6EECF244321}">
+                <p14:modId xmlns:p14="http://schemas.microsoft.com/office/powerpoint/2010/main" val="465419092"/>
+              </p:ext>
+            </p:extLst>
+          </p:nvPr>
+        </p:nvGraphicFramePr>
+        <p:xfrm>
+          <a:off x="7962085" y="847039"/>
+          <a:ext cx="3381417" cy="2364090"/>
+        </p:xfrm>
+        <a:graphic>
+          <a:graphicData uri="http://schemas.openxmlformats.org/drawingml/2006/table">
+            <a:tbl>
+              <a:tblPr firstRow="1" bandRow="1">
+                <a:tableStyleId>{5C22544A-7EE6-4342-B048-85BDC9FD1C3A}</a:tableStyleId>
+              </a:tblPr>
+              <a:tblGrid>
+                <a:gridCol w="1127139"/>
+                <a:gridCol w="1127139"/>
+                <a:gridCol w="1127139"/>
+              </a:tblGrid>
+              <a:tr h="472818">
+                <a:tc>
+                  <a:txBody>
+                    <a:bodyPr/>
+                    <a:lstStyle/>
+                    <a:p>
+                      <a:pPr algn="ctr"/>
+                      <a:r>
+                        <a:rPr lang="en-US" dirty="0" smtClean="0"/>
+                        <a:t>ID</a:t>
+                      </a:r>
+                      <a:endParaRPr lang="en-US" dirty="0"/>
+                    </a:p>
+                  </a:txBody>
+                  <a:tcPr/>
+                </a:tc>
+                <a:tc>
+                  <a:txBody>
+                    <a:bodyPr/>
+                    <a:lstStyle/>
+                    <a:p>
+                      <a:pPr algn="ctr"/>
+                      <a:r>
+                        <a:rPr lang="en-US" dirty="0" smtClean="0"/>
+                        <a:t>Contents</a:t>
+                      </a:r>
+                      <a:endParaRPr lang="en-US" dirty="0"/>
+                    </a:p>
+                  </a:txBody>
+                  <a:tcPr/>
+                </a:tc>
+                <a:tc>
+                  <a:txBody>
+                    <a:bodyPr/>
+                    <a:lstStyle/>
+                    <a:p>
+                      <a:pPr algn="ctr"/>
+                      <a:r>
+                        <a:rPr lang="en-US" dirty="0" smtClean="0"/>
+                        <a:t>Done</a:t>
+                      </a:r>
+                      <a:endParaRPr lang="en-US" dirty="0"/>
+                    </a:p>
+                  </a:txBody>
+                  <a:tcPr/>
+                </a:tc>
+              </a:tr>
+              <a:tr h="472818">
+                <a:tc>
+                  <a:txBody>
+                    <a:bodyPr/>
+                    <a:lstStyle/>
+                    <a:p>
+                      <a:r>
+                        <a:rPr lang="en-US" dirty="0" smtClean="0"/>
+                        <a:t>1</a:t>
+                      </a:r>
+                      <a:endParaRPr lang="en-US" dirty="0"/>
+                    </a:p>
+                  </a:txBody>
+                  <a:tcPr/>
+                </a:tc>
+                <a:tc>
+                  <a:txBody>
+                    <a:bodyPr/>
+                    <a:lstStyle/>
+                    <a:p>
+                      <a:r>
+                        <a:rPr lang="en-US" dirty="0" smtClean="0"/>
+                        <a:t>Ham</a:t>
+                      </a:r>
+                      <a:endParaRPr lang="en-US" dirty="0"/>
+                    </a:p>
+                  </a:txBody>
+                  <a:tcPr/>
+                </a:tc>
+                <a:tc>
+                  <a:txBody>
+                    <a:bodyPr/>
+                    <a:lstStyle/>
+                    <a:p>
+                      <a:r>
+                        <a:rPr lang="en-US" dirty="0" smtClean="0"/>
+                        <a:t>Y</a:t>
+                      </a:r>
+                      <a:endParaRPr lang="en-US" dirty="0"/>
+                    </a:p>
+                  </a:txBody>
+                  <a:tcPr/>
+                </a:tc>
+              </a:tr>
+              <a:tr h="472818">
+                <a:tc>
+                  <a:txBody>
+                    <a:bodyPr/>
+                    <a:lstStyle/>
+                    <a:p>
+                      <a:r>
+                        <a:rPr lang="en-US" dirty="0" smtClean="0"/>
+                        <a:t>2</a:t>
+                      </a:r>
+                      <a:endParaRPr lang="en-US" dirty="0"/>
+                    </a:p>
+                  </a:txBody>
+                  <a:tcPr/>
+                </a:tc>
+                <a:tc>
+                  <a:txBody>
+                    <a:bodyPr/>
+                    <a:lstStyle/>
+                    <a:p>
+                      <a:r>
+                        <a:rPr lang="en-US" dirty="0" smtClean="0"/>
+                        <a:t>Cheese</a:t>
+                      </a:r>
+                      <a:endParaRPr lang="en-US" dirty="0"/>
+                    </a:p>
+                  </a:txBody>
+                  <a:tcPr/>
+                </a:tc>
+                <a:tc>
+                  <a:txBody>
+                    <a:bodyPr/>
+                    <a:lstStyle/>
+                    <a:p>
+                      <a:r>
+                        <a:rPr lang="en-US" dirty="0" smtClean="0"/>
+                        <a:t>N</a:t>
+                      </a:r>
+                      <a:endParaRPr lang="en-US" dirty="0"/>
+                    </a:p>
+                  </a:txBody>
+                  <a:tcPr/>
+                </a:tc>
+              </a:tr>
+              <a:tr h="472818">
+                <a:tc>
+                  <a:txBody>
+                    <a:bodyPr/>
+                    <a:lstStyle/>
+                    <a:p>
+                      <a:r>
+                        <a:rPr lang="en-US" dirty="0" smtClean="0"/>
+                        <a:t>3</a:t>
+                      </a:r>
+                      <a:endParaRPr lang="en-US" dirty="0"/>
+                    </a:p>
+                  </a:txBody>
+                  <a:tcPr/>
+                </a:tc>
+                <a:tc>
+                  <a:txBody>
+                    <a:bodyPr/>
+                    <a:lstStyle/>
+                    <a:p>
+                      <a:r>
+                        <a:rPr lang="en-US" dirty="0" smtClean="0"/>
+                        <a:t>Plain</a:t>
+                      </a:r>
+                      <a:endParaRPr lang="en-US" dirty="0"/>
+                    </a:p>
+                  </a:txBody>
+                  <a:tcPr/>
+                </a:tc>
+                <a:tc>
+                  <a:txBody>
+                    <a:bodyPr/>
+                    <a:lstStyle/>
+                    <a:p>
+                      <a:r>
+                        <a:rPr lang="en-US" dirty="0" smtClean="0"/>
+                        <a:t>N</a:t>
+                      </a:r>
+                      <a:endParaRPr lang="en-US" dirty="0"/>
+                    </a:p>
+                  </a:txBody>
+                  <a:tcPr/>
+                </a:tc>
+              </a:tr>
+              <a:tr h="472818">
+                <a:tc>
+                  <a:txBody>
+                    <a:bodyPr/>
+                    <a:lstStyle/>
+                    <a:p>
+                      <a:r>
+                        <a:rPr lang="en-US" dirty="0" smtClean="0"/>
+                        <a:t>4</a:t>
+                      </a:r>
+                      <a:endParaRPr lang="en-US" dirty="0"/>
+                    </a:p>
+                  </a:txBody>
+                  <a:tcPr/>
+                </a:tc>
+                <a:tc>
+                  <a:txBody>
+                    <a:bodyPr/>
+                    <a:lstStyle/>
+                    <a:p>
+                      <a:r>
+                        <a:rPr lang="mr-IN" dirty="0" smtClean="0"/>
+                        <a:t>…</a:t>
+                      </a:r>
+                      <a:endParaRPr lang="en-US" dirty="0"/>
+                    </a:p>
+                  </a:txBody>
+                  <a:tcPr/>
+                </a:tc>
+                <a:tc>
+                  <a:txBody>
+                    <a:bodyPr/>
+                    <a:lstStyle/>
+                    <a:p>
+                      <a:r>
+                        <a:rPr lang="mr-IN" dirty="0" smtClean="0"/>
+                        <a:t>…</a:t>
+                      </a:r>
+                      <a:endParaRPr lang="en-US" dirty="0"/>
+                    </a:p>
+                  </a:txBody>
+                  <a:tcPr/>
+                </a:tc>
+              </a:tr>
+            </a:tbl>
+          </a:graphicData>
+        </a:graphic>
+      </p:graphicFrame>
+      <p:cxnSp>
+        <p:nvCxnSpPr>
+          <p:cNvPr id="12" name="Straight Arrow Connector 11"/>
+          <p:cNvCxnSpPr/>
+          <p:nvPr/>
+        </p:nvCxnSpPr>
+        <p:spPr>
+          <a:xfrm flipV="1">
+            <a:off x="1149178" y="1000897"/>
+            <a:ext cx="1260390" cy="74141"/>
+          </a:xfrm>
+          <a:prstGeom prst="straightConnector1">
+            <a:avLst/>
+          </a:prstGeom>
+          <a:ln>
+            <a:tailEnd type="triangle"/>
+          </a:ln>
+        </p:spPr>
+        <p:style>
+          <a:lnRef idx="1">
+            <a:schemeClr val="accent1"/>
+          </a:lnRef>
+          <a:fillRef idx="0">
+            <a:schemeClr val="accent1"/>
+          </a:fillRef>
+          <a:effectRef idx="0">
+            <a:schemeClr val="accent1"/>
+          </a:effectRef>
+          <a:fontRef idx="minor">
+            <a:schemeClr val="tx1"/>
+          </a:fontRef>
+        </p:style>
+      </p:cxnSp>
+      <p:cxnSp>
+        <p:nvCxnSpPr>
+          <p:cNvPr id="13" name="Straight Arrow Connector 12"/>
+          <p:cNvCxnSpPr/>
+          <p:nvPr/>
+        </p:nvCxnSpPr>
+        <p:spPr>
+          <a:xfrm flipV="1">
+            <a:off x="1262706" y="1835156"/>
+            <a:ext cx="1260390" cy="74141"/>
+          </a:xfrm>
+          <a:prstGeom prst="straightConnector1">
+            <a:avLst/>
+          </a:prstGeom>
+          <a:ln>
+            <a:tailEnd type="triangle"/>
+          </a:ln>
+        </p:spPr>
+        <p:style>
+          <a:lnRef idx="1">
+            <a:schemeClr val="accent1"/>
+          </a:lnRef>
+          <a:fillRef idx="0">
+            <a:schemeClr val="accent1"/>
+          </a:fillRef>
+          <a:effectRef idx="0">
+            <a:schemeClr val="accent1"/>
+          </a:effectRef>
+          <a:fontRef idx="minor">
+            <a:schemeClr val="tx1"/>
+          </a:fontRef>
+        </p:style>
+      </p:cxnSp>
+      <p:cxnSp>
+        <p:nvCxnSpPr>
+          <p:cNvPr id="14" name="Straight Arrow Connector 13"/>
+          <p:cNvCxnSpPr/>
+          <p:nvPr/>
+        </p:nvCxnSpPr>
+        <p:spPr>
+          <a:xfrm flipV="1">
+            <a:off x="1262706" y="2791683"/>
+            <a:ext cx="1260390" cy="74141"/>
+          </a:xfrm>
+          <a:prstGeom prst="straightConnector1">
+            <a:avLst/>
+          </a:prstGeom>
+          <a:ln>
+            <a:tailEnd type="triangle"/>
+          </a:ln>
+        </p:spPr>
+        <p:style>
+          <a:lnRef idx="1">
+            <a:schemeClr val="accent1"/>
+          </a:lnRef>
+          <a:fillRef idx="0">
+            <a:schemeClr val="accent1"/>
+          </a:fillRef>
+          <a:effectRef idx="0">
+            <a:schemeClr val="accent1"/>
+          </a:effectRef>
+          <a:fontRef idx="minor">
+            <a:schemeClr val="tx1"/>
+          </a:fontRef>
+        </p:style>
+      </p:cxnSp>
+      <p:cxnSp>
+        <p:nvCxnSpPr>
+          <p:cNvPr id="15" name="Straight Arrow Connector 14"/>
+          <p:cNvCxnSpPr/>
+          <p:nvPr/>
+        </p:nvCxnSpPr>
+        <p:spPr>
+          <a:xfrm flipV="1">
+            <a:off x="1282528" y="3744353"/>
+            <a:ext cx="1260390" cy="74141"/>
+          </a:xfrm>
+          <a:prstGeom prst="straightConnector1">
+            <a:avLst/>
+          </a:prstGeom>
+          <a:ln>
+            <a:tailEnd type="triangle"/>
+          </a:ln>
+        </p:spPr>
+        <p:style>
+          <a:lnRef idx="1">
+            <a:schemeClr val="accent1"/>
+          </a:lnRef>
+          <a:fillRef idx="0">
+            <a:schemeClr val="accent1"/>
+          </a:fillRef>
+          <a:effectRef idx="0">
+            <a:schemeClr val="accent1"/>
+          </a:effectRef>
+          <a:fontRef idx="minor">
+            <a:schemeClr val="tx1"/>
+          </a:fontRef>
+        </p:style>
+      </p:cxnSp>
+      <p:cxnSp>
+        <p:nvCxnSpPr>
+          <p:cNvPr id="16" name="Straight Arrow Connector 15"/>
+          <p:cNvCxnSpPr/>
+          <p:nvPr/>
+        </p:nvCxnSpPr>
+        <p:spPr>
+          <a:xfrm flipV="1">
+            <a:off x="1282528" y="4113685"/>
+            <a:ext cx="1260390" cy="74141"/>
+          </a:xfrm>
+          <a:prstGeom prst="straightConnector1">
+            <a:avLst/>
+          </a:prstGeom>
+          <a:ln>
+            <a:tailEnd type="triangle"/>
+          </a:ln>
+        </p:spPr>
+        <p:style>
+          <a:lnRef idx="1">
+            <a:schemeClr val="accent1"/>
+          </a:lnRef>
+          <a:fillRef idx="0">
+            <a:schemeClr val="accent1"/>
+          </a:fillRef>
+          <a:effectRef idx="0">
+            <a:schemeClr val="accent1"/>
+          </a:effectRef>
+          <a:fontRef idx="minor">
+            <a:schemeClr val="tx1"/>
+          </a:fontRef>
+        </p:style>
+      </p:cxnSp>
+      <p:sp>
+        <p:nvSpPr>
+          <p:cNvPr id="17" name="TextBox 16"/>
           <p:cNvSpPr txBox="1"/>
           <p:nvPr/>
         </p:nvSpPr>
         <p:spPr>
           <a:xfrm>
-            <a:off x="2403034" y="1395985"/>
-            <a:ext cx="1270332" cy="646331"/>
+            <a:off x="1293130" y="814270"/>
+            <a:ext cx="619593" cy="276999"/>
+          </a:xfrm>
+          <a:prstGeom prst="rect">
+            <a:avLst/>
+          </a:prstGeom>
+          <a:noFill/>
+        </p:spPr>
+        <p:txBody>
+          <a:bodyPr wrap="square" rtlCol="0">
+            <a:spAutoFit/>
+          </a:bodyPr>
+          <a:lstStyle/>
+          <a:p>
+            <a:r>
+              <a:rPr lang="en-US" sz="1200" smtClean="0"/>
+              <a:t>20</a:t>
+            </a:r>
+            <a:endParaRPr lang="en-US" sz="1200" dirty="0"/>
+          </a:p>
+        </p:txBody>
+      </p:sp>
+      <p:sp>
+        <p:nvSpPr>
+          <p:cNvPr id="18" name="TextBox 17"/>
+          <p:cNvSpPr txBox="1"/>
+          <p:nvPr/>
+        </p:nvSpPr>
+        <p:spPr>
+          <a:xfrm>
+            <a:off x="1293130" y="1632298"/>
+            <a:ext cx="619593" cy="276999"/>
+          </a:xfrm>
+          <a:prstGeom prst="rect">
+            <a:avLst/>
+          </a:prstGeom>
+          <a:noFill/>
+        </p:spPr>
+        <p:txBody>
+          <a:bodyPr wrap="square" rtlCol="0">
+            <a:spAutoFit/>
+          </a:bodyPr>
+          <a:lstStyle/>
+          <a:p>
+            <a:r>
+              <a:rPr lang="en-US" sz="1200" dirty="0" smtClean="0"/>
+              <a:t>8</a:t>
+            </a:r>
+            <a:endParaRPr lang="en-US" sz="1200" dirty="0"/>
+          </a:p>
+        </p:txBody>
+      </p:sp>
+      <p:sp>
+        <p:nvSpPr>
+          <p:cNvPr id="19" name="TextBox 18"/>
+          <p:cNvSpPr txBox="1"/>
+          <p:nvPr/>
+        </p:nvSpPr>
+        <p:spPr>
+          <a:xfrm>
+            <a:off x="1262706" y="2533655"/>
+            <a:ext cx="619593" cy="276999"/>
+          </a:xfrm>
+          <a:prstGeom prst="rect">
+            <a:avLst/>
+          </a:prstGeom>
+          <a:noFill/>
+        </p:spPr>
+        <p:txBody>
+          <a:bodyPr wrap="square" rtlCol="0">
+            <a:spAutoFit/>
+          </a:bodyPr>
+          <a:lstStyle/>
+          <a:p>
+            <a:r>
+              <a:rPr lang="en-US" sz="1200" dirty="0" smtClean="0"/>
+              <a:t>3</a:t>
+            </a:r>
+            <a:endParaRPr lang="en-US" sz="1200" dirty="0"/>
+          </a:p>
+        </p:txBody>
+      </p:sp>
+      <p:sp>
+        <p:nvSpPr>
+          <p:cNvPr id="20" name="TextBox 19"/>
+          <p:cNvSpPr txBox="1"/>
+          <p:nvPr/>
+        </p:nvSpPr>
+        <p:spPr>
+          <a:xfrm>
+            <a:off x="1293130" y="3550591"/>
+            <a:ext cx="619593" cy="276999"/>
+          </a:xfrm>
+          <a:prstGeom prst="rect">
+            <a:avLst/>
+          </a:prstGeom>
+          <a:noFill/>
+        </p:spPr>
+        <p:txBody>
+          <a:bodyPr wrap="square" rtlCol="0">
+            <a:spAutoFit/>
+          </a:bodyPr>
+          <a:lstStyle/>
+          <a:p>
+            <a:r>
+              <a:rPr lang="en-US" sz="1200" dirty="0" smtClean="0"/>
+              <a:t>9</a:t>
+            </a:r>
+            <a:endParaRPr lang="en-US" sz="1200" dirty="0"/>
+          </a:p>
+        </p:txBody>
+      </p:sp>
+      <p:sp>
+        <p:nvSpPr>
+          <p:cNvPr id="21" name="TextBox 20"/>
+          <p:cNvSpPr txBox="1"/>
+          <p:nvPr/>
+        </p:nvSpPr>
+        <p:spPr>
+          <a:xfrm>
+            <a:off x="1273308" y="3975185"/>
+            <a:ext cx="619593" cy="276999"/>
+          </a:xfrm>
+          <a:prstGeom prst="rect">
+            <a:avLst/>
+          </a:prstGeom>
+          <a:noFill/>
+        </p:spPr>
+        <p:txBody>
+          <a:bodyPr wrap="square" rtlCol="0">
+            <a:spAutoFit/>
+          </a:bodyPr>
+          <a:lstStyle/>
+          <a:p>
+            <a:r>
+              <a:rPr lang="en-US" sz="1200" dirty="0" smtClean="0"/>
+              <a:t>11</a:t>
+            </a:r>
+            <a:endParaRPr lang="en-US" sz="1200" dirty="0"/>
+          </a:p>
+        </p:txBody>
+      </p:sp>
+      <p:sp>
+        <p:nvSpPr>
+          <p:cNvPr id="22" name="TextBox 21"/>
+          <p:cNvSpPr txBox="1"/>
+          <p:nvPr/>
+        </p:nvSpPr>
+        <p:spPr>
+          <a:xfrm>
+            <a:off x="5058245" y="1466509"/>
+            <a:ext cx="1747195" cy="923330"/>
           </a:xfrm>
           <a:prstGeom prst="rect">
             <a:avLst/>
@@ -3237,12 +5014,804 @@
           <a:lstStyle/>
           <a:p>
             <a:r>
-              <a:rPr lang="en-US" smtClean="0"/>
-              <a:t>Gateway </a:t>
+              <a:rPr lang="en-US" dirty="0" err="1" smtClean="0"/>
+              <a:t>Notifier</a:t>
             </a:r>
             <a:r>
               <a:rPr lang="en-US" dirty="0" smtClean="0"/>
-              <a:t>1</a:t>
+              <a:t> / Load Balancing</a:t>
+            </a:r>
+          </a:p>
+          <a:p>
+            <a:endParaRPr lang="en-US" dirty="0"/>
+          </a:p>
+        </p:txBody>
+      </p:sp>
+      <p:cxnSp>
+        <p:nvCxnSpPr>
+          <p:cNvPr id="24" name="Straight Arrow Connector 23"/>
+          <p:cNvCxnSpPr>
+            <a:stCxn id="3" idx="3"/>
+            <a:endCxn id="22" idx="1"/>
+          </p:cNvCxnSpPr>
+          <p:nvPr/>
+        </p:nvCxnSpPr>
+        <p:spPr>
+          <a:xfrm>
+            <a:off x="3679740" y="1031705"/>
+            <a:ext cx="1378505" cy="896469"/>
+          </a:xfrm>
+          <a:prstGeom prst="straightConnector1">
+            <a:avLst/>
+          </a:prstGeom>
+          <a:ln>
+            <a:headEnd type="triangle"/>
+            <a:tailEnd type="triangle"/>
+          </a:ln>
+        </p:spPr>
+        <p:style>
+          <a:lnRef idx="1">
+            <a:schemeClr val="accent1"/>
+          </a:lnRef>
+          <a:fillRef idx="0">
+            <a:schemeClr val="accent1"/>
+          </a:fillRef>
+          <a:effectRef idx="0">
+            <a:schemeClr val="accent1"/>
+          </a:effectRef>
+          <a:fontRef idx="minor">
+            <a:schemeClr val="tx1"/>
+          </a:fontRef>
+        </p:style>
+      </p:cxnSp>
+      <p:cxnSp>
+        <p:nvCxnSpPr>
+          <p:cNvPr id="26" name="Straight Arrow Connector 25"/>
+          <p:cNvCxnSpPr>
+            <a:stCxn id="5" idx="3"/>
+            <a:endCxn id="22" idx="1"/>
+          </p:cNvCxnSpPr>
+          <p:nvPr/>
+        </p:nvCxnSpPr>
+        <p:spPr>
+          <a:xfrm>
+            <a:off x="3679740" y="1829747"/>
+            <a:ext cx="1378505" cy="98427"/>
+          </a:xfrm>
+          <a:prstGeom prst="straightConnector1">
+            <a:avLst/>
+          </a:prstGeom>
+          <a:ln>
+            <a:headEnd type="triangle"/>
+            <a:tailEnd type="triangle"/>
+          </a:ln>
+        </p:spPr>
+        <p:style>
+          <a:lnRef idx="1">
+            <a:schemeClr val="accent1"/>
+          </a:lnRef>
+          <a:fillRef idx="0">
+            <a:schemeClr val="accent1"/>
+          </a:fillRef>
+          <a:effectRef idx="0">
+            <a:schemeClr val="accent1"/>
+          </a:effectRef>
+          <a:fontRef idx="minor">
+            <a:schemeClr val="tx1"/>
+          </a:fontRef>
+        </p:style>
+      </p:cxnSp>
+      <p:cxnSp>
+        <p:nvCxnSpPr>
+          <p:cNvPr id="28" name="Straight Arrow Connector 27"/>
+          <p:cNvCxnSpPr>
+            <a:stCxn id="6" idx="3"/>
+            <a:endCxn id="22" idx="1"/>
+          </p:cNvCxnSpPr>
+          <p:nvPr/>
+        </p:nvCxnSpPr>
+        <p:spPr>
+          <a:xfrm flipV="1">
+            <a:off x="3679740" y="1928174"/>
+            <a:ext cx="1378505" cy="858876"/>
+          </a:xfrm>
+          <a:prstGeom prst="straightConnector1">
+            <a:avLst/>
+          </a:prstGeom>
+          <a:ln>
+            <a:headEnd type="triangle"/>
+            <a:tailEnd type="triangle"/>
+          </a:ln>
+        </p:spPr>
+        <p:style>
+          <a:lnRef idx="1">
+            <a:schemeClr val="accent1"/>
+          </a:lnRef>
+          <a:fillRef idx="0">
+            <a:schemeClr val="accent1"/>
+          </a:fillRef>
+          <a:effectRef idx="0">
+            <a:schemeClr val="accent1"/>
+          </a:effectRef>
+          <a:fontRef idx="minor">
+            <a:schemeClr val="tx1"/>
+          </a:fontRef>
+        </p:style>
+      </p:cxnSp>
+      <p:cxnSp>
+        <p:nvCxnSpPr>
+          <p:cNvPr id="30" name="Straight Arrow Connector 29"/>
+          <p:cNvCxnSpPr>
+            <a:stCxn id="7" idx="3"/>
+          </p:cNvCxnSpPr>
+          <p:nvPr/>
+        </p:nvCxnSpPr>
+        <p:spPr>
+          <a:xfrm flipV="1">
+            <a:off x="3679740" y="1909297"/>
+            <a:ext cx="1378506" cy="1835056"/>
+          </a:xfrm>
+          <a:prstGeom prst="straightConnector1">
+            <a:avLst/>
+          </a:prstGeom>
+          <a:ln>
+            <a:headEnd type="triangle"/>
+            <a:tailEnd type="triangle"/>
+          </a:ln>
+        </p:spPr>
+        <p:style>
+          <a:lnRef idx="1">
+            <a:schemeClr val="accent1"/>
+          </a:lnRef>
+          <a:fillRef idx="0">
+            <a:schemeClr val="accent1"/>
+          </a:fillRef>
+          <a:effectRef idx="0">
+            <a:schemeClr val="accent1"/>
+          </a:effectRef>
+          <a:fontRef idx="minor">
+            <a:schemeClr val="tx1"/>
+          </a:fontRef>
+        </p:style>
+      </p:cxnSp>
+      <p:sp>
+        <p:nvSpPr>
+          <p:cNvPr id="31" name="TextBox 30"/>
+          <p:cNvSpPr txBox="1"/>
+          <p:nvPr/>
+        </p:nvSpPr>
+        <p:spPr>
+          <a:xfrm>
+            <a:off x="4000120" y="1031705"/>
+            <a:ext cx="816442" cy="276999"/>
+          </a:xfrm>
+          <a:prstGeom prst="rect">
+            <a:avLst/>
+          </a:prstGeom>
+          <a:noFill/>
+        </p:spPr>
+        <p:txBody>
+          <a:bodyPr wrap="none" rtlCol="0">
+            <a:spAutoFit/>
+          </a:bodyPr>
+          <a:lstStyle/>
+          <a:p>
+            <a:r>
+              <a:rPr lang="en-US" sz="1200" smtClean="0"/>
+              <a:t>Heartbeat</a:t>
+            </a:r>
+            <a:endParaRPr lang="en-US" sz="1200" dirty="0"/>
+          </a:p>
+        </p:txBody>
+      </p:sp>
+      <p:sp>
+        <p:nvSpPr>
+          <p:cNvPr id="32" name="TextBox 31"/>
+          <p:cNvSpPr txBox="1"/>
+          <p:nvPr/>
+        </p:nvSpPr>
+        <p:spPr>
+          <a:xfrm>
+            <a:off x="4786138" y="2631140"/>
+            <a:ext cx="2547908" cy="2862322"/>
+          </a:xfrm>
+          <a:prstGeom prst="rect">
+            <a:avLst/>
+          </a:prstGeom>
+          <a:noFill/>
+          <a:ln>
+            <a:noFill/>
+          </a:ln>
+        </p:spPr>
+        <p:txBody>
+          <a:bodyPr wrap="square" rtlCol="0">
+            <a:spAutoFit/>
+          </a:bodyPr>
+          <a:lstStyle/>
+          <a:p>
+            <a:pPr marL="285750" indent="-285750">
+              <a:buFont typeface="Arial" charset="0"/>
+              <a:buChar char="•"/>
+            </a:pPr>
+            <a:r>
+              <a:rPr lang="en-US" dirty="0" smtClean="0"/>
+              <a:t>If server doesn’t respond, </a:t>
+            </a:r>
+            <a:r>
+              <a:rPr lang="en-US" dirty="0" err="1" smtClean="0"/>
+              <a:t>notifier</a:t>
+            </a:r>
+            <a:r>
+              <a:rPr lang="en-US" dirty="0" smtClean="0"/>
+              <a:t> finds ids to dead server</a:t>
+            </a:r>
+          </a:p>
+          <a:p>
+            <a:pPr marL="285750" indent="-285750">
+              <a:buFont typeface="Arial" charset="0"/>
+              <a:buChar char="•"/>
+            </a:pPr>
+            <a:r>
+              <a:rPr lang="en-US" dirty="0" smtClean="0"/>
+              <a:t>Redistributes orders to other servers</a:t>
+            </a:r>
+          </a:p>
+          <a:p>
+            <a:pPr marL="285750" indent="-285750">
+              <a:buFont typeface="Arial" charset="0"/>
+              <a:buChar char="•"/>
+            </a:pPr>
+            <a:r>
+              <a:rPr lang="en-US" dirty="0" smtClean="0"/>
+              <a:t>Load balancing/ consistent hashing deals with duplicates, not sent to multiple servers</a:t>
+            </a:r>
+            <a:endParaRPr lang="en-US" dirty="0"/>
+          </a:p>
+        </p:txBody>
+      </p:sp>
+      <p:sp>
+        <p:nvSpPr>
+          <p:cNvPr id="36" name="TextBox 35"/>
+          <p:cNvSpPr txBox="1"/>
+          <p:nvPr/>
+        </p:nvSpPr>
+        <p:spPr>
+          <a:xfrm>
+            <a:off x="469131" y="5313405"/>
+            <a:ext cx="1990417" cy="1015663"/>
+          </a:xfrm>
+          <a:prstGeom prst="rect">
+            <a:avLst/>
+          </a:prstGeom>
+          <a:noFill/>
+        </p:spPr>
+        <p:txBody>
+          <a:bodyPr wrap="none" rtlCol="0">
+            <a:spAutoFit/>
+          </a:bodyPr>
+          <a:lstStyle/>
+          <a:p>
+            <a:r>
+              <a:rPr lang="en-US" sz="1200" dirty="0" smtClean="0"/>
+              <a:t>Features</a:t>
+            </a:r>
+          </a:p>
+          <a:p>
+            <a:pPr marL="228600" indent="-228600">
+              <a:buAutoNum type="arabicParenR"/>
+            </a:pPr>
+            <a:r>
+              <a:rPr lang="en-US" sz="1200" dirty="0" smtClean="0"/>
+              <a:t>Assignment / notification</a:t>
+            </a:r>
+          </a:p>
+          <a:p>
+            <a:pPr marL="228600" indent="-228600">
+              <a:buAutoNum type="arabicParenR"/>
+            </a:pPr>
+            <a:r>
+              <a:rPr lang="en-US" sz="1200" dirty="0" smtClean="0"/>
+              <a:t>Load balancing</a:t>
+            </a:r>
+          </a:p>
+          <a:p>
+            <a:pPr marL="228600" indent="-228600">
+              <a:buAutoNum type="arabicParenR"/>
+            </a:pPr>
+            <a:r>
+              <a:rPr lang="en-US" sz="1200" dirty="0" smtClean="0"/>
+              <a:t>Heartbeat</a:t>
+            </a:r>
+          </a:p>
+          <a:p>
+            <a:pPr marL="228600" indent="-228600">
+              <a:buAutoNum type="arabicParenR"/>
+            </a:pPr>
+            <a:r>
+              <a:rPr lang="en-US" sz="1200" dirty="0" smtClean="0"/>
+              <a:t>persistence</a:t>
+            </a:r>
+            <a:endParaRPr lang="en-US" sz="1200" dirty="0" smtClean="0"/>
+          </a:p>
+        </p:txBody>
+      </p:sp>
+    </p:spTree>
+    <p:extLst>
+      <p:ext uri="{BB962C8B-B14F-4D97-AF65-F5344CB8AC3E}">
+        <p14:creationId xmlns:p14="http://schemas.microsoft.com/office/powerpoint/2010/main" val="601108246"/>
+      </p:ext>
+    </p:extLst>
+  </p:cSld>
+  <p:clrMapOvr>
+    <a:masterClrMapping/>
+  </p:clrMapOvr>
+</p:sld>
+</file>
+
+<file path=ppt/slides/slide4.xml><?xml version="1.0" encoding="utf-8"?>
+<p:sld xmlns:a="http://schemas.openxmlformats.org/drawingml/2006/main" xmlns:r="http://schemas.openxmlformats.org/officeDocument/2006/relationships" xmlns:p="http://schemas.openxmlformats.org/presentationml/2006/main">
+  <p:cSld>
+    <p:spTree>
+      <p:nvGrpSpPr>
+        <p:cNvPr id="1" name=""/>
+        <p:cNvGrpSpPr/>
+        <p:nvPr/>
+      </p:nvGrpSpPr>
+      <p:grpSpPr>
+        <a:xfrm>
+          <a:off x="0" y="0"/>
+          <a:ext cx="0" cy="0"/>
+          <a:chOff x="0" y="0"/>
+          <a:chExt cx="0" cy="0"/>
+        </a:xfrm>
+      </p:grpSpPr>
+      <p:sp>
+        <p:nvSpPr>
+          <p:cNvPr id="3" name="Content Placeholder 2"/>
+          <p:cNvSpPr>
+            <a:spLocks noGrp="1"/>
+          </p:cNvSpPr>
+          <p:nvPr>
+            <p:ph idx="1"/>
+          </p:nvPr>
+        </p:nvSpPr>
+        <p:spPr/>
+        <p:txBody>
+          <a:bodyPr/>
+          <a:lstStyle/>
+          <a:p>
+            <a:pPr marL="0" indent="0">
+              <a:buNone/>
+            </a:pPr>
+            <a:r>
+              <a:rPr lang="en-US" dirty="0">
+                <a:hlinkClick r:id="rId2"/>
+              </a:rPr>
+              <a:t>https://www.youtube.com/watch?v=qYhRvH9tJKw&amp;list=PLMCXHnjXnTnvo6alSjVkgxV-VH6EPyvoX&amp;index=6</a:t>
+            </a:r>
+            <a:endParaRPr lang="en-US" dirty="0"/>
+          </a:p>
+        </p:txBody>
+      </p:sp>
+      <p:sp>
+        <p:nvSpPr>
+          <p:cNvPr id="4" name="Rectangle 3"/>
+          <p:cNvSpPr/>
+          <p:nvPr/>
+        </p:nvSpPr>
+        <p:spPr>
+          <a:xfrm>
+            <a:off x="3414163" y="0"/>
+            <a:ext cx="4901932" cy="523220"/>
+          </a:xfrm>
+          <a:prstGeom prst="rect">
+            <a:avLst/>
+          </a:prstGeom>
+          <a:noFill/>
+        </p:spPr>
+        <p:txBody>
+          <a:bodyPr wrap="square" lIns="91440" tIns="45720" rIns="91440" bIns="45720">
+            <a:spAutoFit/>
+          </a:bodyPr>
+          <a:lstStyle/>
+          <a:p>
+            <a:pPr algn="ctr"/>
+            <a:r>
+              <a:rPr lang="en-US" sz="2800" b="0" cap="none" spc="0" dirty="0" err="1" smtClean="0">
+                <a:ln w="0"/>
+                <a:solidFill>
+                  <a:schemeClr val="accent2"/>
+                </a:solidFill>
+                <a:effectLst>
+                  <a:outerShdw blurRad="38100" dist="19050" dir="2700000" algn="tl" rotWithShape="0">
+                    <a:schemeClr val="dk1">
+                      <a:alpha val="40000"/>
+                    </a:schemeClr>
+                  </a:outerShdw>
+                </a:effectLst>
+              </a:rPr>
+              <a:t>Monolithis</a:t>
+            </a:r>
+            <a:r>
+              <a:rPr lang="en-US" sz="2800" b="0" cap="none" spc="0" dirty="0" smtClean="0">
+                <a:ln w="0"/>
+                <a:solidFill>
+                  <a:schemeClr val="accent2"/>
+                </a:solidFill>
+                <a:effectLst>
+                  <a:outerShdw blurRad="38100" dist="19050" dir="2700000" algn="tl" rotWithShape="0">
+                    <a:schemeClr val="dk1">
+                      <a:alpha val="40000"/>
+                    </a:schemeClr>
+                  </a:outerShdw>
+                </a:effectLst>
+              </a:rPr>
+              <a:t> </a:t>
+            </a:r>
+            <a:r>
+              <a:rPr lang="en-US" sz="2800" dirty="0">
+                <a:ln w="0"/>
+                <a:solidFill>
+                  <a:schemeClr val="accent2"/>
+                </a:solidFill>
+                <a:effectLst>
+                  <a:outerShdw blurRad="38100" dist="19050" dir="2700000" algn="tl" rotWithShape="0">
+                    <a:schemeClr val="dk1">
+                      <a:alpha val="40000"/>
+                    </a:schemeClr>
+                  </a:outerShdw>
+                </a:effectLst>
+              </a:rPr>
+              <a:t>v</a:t>
+            </a:r>
+            <a:r>
+              <a:rPr lang="en-US" sz="2800" b="0" cap="none" spc="0" dirty="0" smtClean="0">
+                <a:ln w="0"/>
+                <a:solidFill>
+                  <a:schemeClr val="accent2"/>
+                </a:solidFill>
+                <a:effectLst>
+                  <a:outerShdw blurRad="38100" dist="19050" dir="2700000" algn="tl" rotWithShape="0">
+                    <a:schemeClr val="dk1">
+                      <a:alpha val="40000"/>
+                    </a:schemeClr>
+                  </a:outerShdw>
+                </a:effectLst>
+              </a:rPr>
+              <a:t>s </a:t>
+            </a:r>
+            <a:r>
+              <a:rPr lang="en-US" sz="2800" b="0" cap="none" spc="0" dirty="0" err="1" smtClean="0">
+                <a:ln w="0"/>
+                <a:solidFill>
+                  <a:schemeClr val="accent2"/>
+                </a:solidFill>
+                <a:effectLst>
+                  <a:outerShdw blurRad="38100" dist="19050" dir="2700000" algn="tl" rotWithShape="0">
+                    <a:schemeClr val="dk1">
+                      <a:alpha val="40000"/>
+                    </a:schemeClr>
+                  </a:outerShdw>
+                </a:effectLst>
+              </a:rPr>
+              <a:t>MicroServices</a:t>
+            </a:r>
+            <a:endParaRPr lang="en-US" sz="5400" b="0" cap="none" spc="0" dirty="0">
+              <a:ln w="0"/>
+              <a:solidFill>
+                <a:schemeClr val="accent2"/>
+              </a:solidFill>
+              <a:effectLst>
+                <a:outerShdw blurRad="38100" dist="19050" dir="2700000" algn="tl" rotWithShape="0">
+                  <a:schemeClr val="dk1">
+                    <a:alpha val="40000"/>
+                  </a:schemeClr>
+                </a:outerShdw>
+              </a:effectLst>
+            </a:endParaRPr>
+          </a:p>
+        </p:txBody>
+      </p:sp>
+    </p:spTree>
+    <p:extLst>
+      <p:ext uri="{BB962C8B-B14F-4D97-AF65-F5344CB8AC3E}">
+        <p14:creationId xmlns:p14="http://schemas.microsoft.com/office/powerpoint/2010/main" val="1582686598"/>
+      </p:ext>
+    </p:extLst>
+  </p:cSld>
+  <p:clrMapOvr>
+    <a:masterClrMapping/>
+  </p:clrMapOvr>
+</p:sld>
+</file>
+
+<file path=ppt/slides/slide5.xml><?xml version="1.0" encoding="utf-8"?>
+<p:sld xmlns:a="http://schemas.openxmlformats.org/drawingml/2006/main" xmlns:r="http://schemas.openxmlformats.org/officeDocument/2006/relationships" xmlns:p="http://schemas.openxmlformats.org/presentationml/2006/main">
+  <p:cSld>
+    <p:spTree>
+      <p:nvGrpSpPr>
+        <p:cNvPr id="1" name=""/>
+        <p:cNvGrpSpPr/>
+        <p:nvPr/>
+      </p:nvGrpSpPr>
+      <p:grpSpPr>
+        <a:xfrm>
+          <a:off x="0" y="0"/>
+          <a:ext cx="0" cy="0"/>
+          <a:chOff x="0" y="0"/>
+          <a:chExt cx="0" cy="0"/>
+        </a:xfrm>
+      </p:grpSpPr>
+      <p:sp>
+        <p:nvSpPr>
+          <p:cNvPr id="4" name="TextBox 3"/>
+          <p:cNvSpPr txBox="1"/>
+          <p:nvPr/>
+        </p:nvSpPr>
+        <p:spPr>
+          <a:xfrm>
+            <a:off x="469131" y="873069"/>
+            <a:ext cx="1136822" cy="646331"/>
+          </a:xfrm>
+          <a:prstGeom prst="rect">
+            <a:avLst/>
+          </a:prstGeom>
+          <a:noFill/>
+          <a:ln>
+            <a:solidFill>
+              <a:schemeClr val="accent1"/>
+            </a:solidFill>
+          </a:ln>
+        </p:spPr>
+        <p:txBody>
+          <a:bodyPr wrap="square" rtlCol="0">
+            <a:spAutoFit/>
+          </a:bodyPr>
+          <a:lstStyle/>
+          <a:p>
+            <a:r>
+              <a:rPr lang="en-US" dirty="0" smtClean="0"/>
+              <a:t>Client 1</a:t>
+            </a:r>
+          </a:p>
+          <a:p>
+            <a:endParaRPr lang="en-US" dirty="0"/>
+          </a:p>
+        </p:txBody>
+      </p:sp>
+      <p:sp>
+        <p:nvSpPr>
+          <p:cNvPr id="5" name="Rectangle 4"/>
+          <p:cNvSpPr/>
+          <p:nvPr/>
+        </p:nvSpPr>
+        <p:spPr>
+          <a:xfrm>
+            <a:off x="4550987" y="0"/>
+            <a:ext cx="3111054" cy="523220"/>
+          </a:xfrm>
+          <a:prstGeom prst="rect">
+            <a:avLst/>
+          </a:prstGeom>
+          <a:noFill/>
+        </p:spPr>
+        <p:txBody>
+          <a:bodyPr wrap="square" lIns="91440" tIns="45720" rIns="91440" bIns="45720">
+            <a:spAutoFit/>
+          </a:bodyPr>
+          <a:lstStyle/>
+          <a:p>
+            <a:pPr algn="ctr"/>
+            <a:r>
+              <a:rPr lang="en-US" sz="2800" b="0" cap="none" spc="0" dirty="0" smtClean="0">
+                <a:ln w="0"/>
+                <a:solidFill>
+                  <a:schemeClr val="accent2"/>
+                </a:solidFill>
+                <a:effectLst>
+                  <a:outerShdw blurRad="38100" dist="19050" dir="2700000" algn="tl" rotWithShape="0">
+                    <a:schemeClr val="dk1">
+                      <a:alpha val="40000"/>
+                    </a:schemeClr>
+                  </a:outerShdw>
+                </a:effectLst>
+              </a:rPr>
+              <a:t>WhatsApp</a:t>
+            </a:r>
+            <a:endParaRPr lang="en-US" sz="5400" b="0" cap="none" spc="0" dirty="0">
+              <a:ln w="0"/>
+              <a:solidFill>
+                <a:schemeClr val="accent2"/>
+              </a:solidFill>
+              <a:effectLst>
+                <a:outerShdw blurRad="38100" dist="19050" dir="2700000" algn="tl" rotWithShape="0">
+                  <a:schemeClr val="dk1">
+                    <a:alpha val="40000"/>
+                  </a:schemeClr>
+                </a:outerShdw>
+              </a:effectLst>
+            </a:endParaRPr>
+          </a:p>
+        </p:txBody>
+      </p:sp>
+      <p:sp>
+        <p:nvSpPr>
+          <p:cNvPr id="6" name="TextBox 5"/>
+          <p:cNvSpPr txBox="1"/>
+          <p:nvPr/>
+        </p:nvSpPr>
+        <p:spPr>
+          <a:xfrm>
+            <a:off x="451236" y="1719151"/>
+            <a:ext cx="1136822" cy="646331"/>
+          </a:xfrm>
+          <a:prstGeom prst="rect">
+            <a:avLst/>
+          </a:prstGeom>
+          <a:noFill/>
+          <a:ln>
+            <a:solidFill>
+              <a:schemeClr val="accent1"/>
+            </a:solidFill>
+          </a:ln>
+        </p:spPr>
+        <p:txBody>
+          <a:bodyPr wrap="square" rtlCol="0">
+            <a:spAutoFit/>
+          </a:bodyPr>
+          <a:lstStyle/>
+          <a:p>
+            <a:r>
+              <a:rPr lang="en-US" dirty="0" smtClean="0"/>
+              <a:t>Client 2</a:t>
+            </a:r>
+          </a:p>
+          <a:p>
+            <a:endParaRPr lang="en-US" dirty="0"/>
+          </a:p>
+        </p:txBody>
+      </p:sp>
+      <p:sp>
+        <p:nvSpPr>
+          <p:cNvPr id="7" name="TextBox 6"/>
+          <p:cNvSpPr txBox="1"/>
+          <p:nvPr/>
+        </p:nvSpPr>
+        <p:spPr>
+          <a:xfrm>
+            <a:off x="449106" y="2565233"/>
+            <a:ext cx="1136822" cy="646331"/>
+          </a:xfrm>
+          <a:prstGeom prst="rect">
+            <a:avLst/>
+          </a:prstGeom>
+          <a:noFill/>
+          <a:ln>
+            <a:solidFill>
+              <a:schemeClr val="accent1"/>
+            </a:solidFill>
+          </a:ln>
+        </p:spPr>
+        <p:txBody>
+          <a:bodyPr wrap="square" rtlCol="0">
+            <a:spAutoFit/>
+          </a:bodyPr>
+          <a:lstStyle/>
+          <a:p>
+            <a:r>
+              <a:rPr lang="en-US" dirty="0" smtClean="0"/>
+              <a:t>Client 3</a:t>
+            </a:r>
+          </a:p>
+          <a:p>
+            <a:endParaRPr lang="en-US" dirty="0"/>
+          </a:p>
+        </p:txBody>
+      </p:sp>
+      <p:sp>
+        <p:nvSpPr>
+          <p:cNvPr id="8" name="TextBox 7"/>
+          <p:cNvSpPr txBox="1"/>
+          <p:nvPr/>
+        </p:nvSpPr>
+        <p:spPr>
+          <a:xfrm>
+            <a:off x="449106" y="3411315"/>
+            <a:ext cx="1136822" cy="646331"/>
+          </a:xfrm>
+          <a:prstGeom prst="rect">
+            <a:avLst/>
+          </a:prstGeom>
+          <a:noFill/>
+          <a:ln>
+            <a:solidFill>
+              <a:schemeClr val="accent1"/>
+            </a:solidFill>
+          </a:ln>
+        </p:spPr>
+        <p:txBody>
+          <a:bodyPr wrap="square" rtlCol="0">
+            <a:spAutoFit/>
+          </a:bodyPr>
+          <a:lstStyle/>
+          <a:p>
+            <a:r>
+              <a:rPr lang="en-US" dirty="0" smtClean="0"/>
+              <a:t>Client 4</a:t>
+            </a:r>
+          </a:p>
+          <a:p>
+            <a:endParaRPr lang="en-US" dirty="0"/>
+          </a:p>
+        </p:txBody>
+      </p:sp>
+      <p:sp>
+        <p:nvSpPr>
+          <p:cNvPr id="9" name="TextBox 8"/>
+          <p:cNvSpPr txBox="1"/>
+          <p:nvPr/>
+        </p:nvSpPr>
+        <p:spPr>
+          <a:xfrm>
+            <a:off x="449106" y="4257397"/>
+            <a:ext cx="1136822" cy="646331"/>
+          </a:xfrm>
+          <a:prstGeom prst="rect">
+            <a:avLst/>
+          </a:prstGeom>
+          <a:noFill/>
+          <a:ln>
+            <a:solidFill>
+              <a:schemeClr val="accent1"/>
+            </a:solidFill>
+          </a:ln>
+        </p:spPr>
+        <p:txBody>
+          <a:bodyPr wrap="square" rtlCol="0">
+            <a:spAutoFit/>
+          </a:bodyPr>
+          <a:lstStyle/>
+          <a:p>
+            <a:r>
+              <a:rPr lang="en-US" dirty="0" smtClean="0"/>
+              <a:t>Client 5</a:t>
+            </a:r>
+          </a:p>
+          <a:p>
+            <a:endParaRPr lang="en-US" dirty="0"/>
+          </a:p>
+        </p:txBody>
+      </p:sp>
+      <p:sp>
+        <p:nvSpPr>
+          <p:cNvPr id="11" name="TextBox 10"/>
+          <p:cNvSpPr txBox="1"/>
+          <p:nvPr/>
+        </p:nvSpPr>
+        <p:spPr>
+          <a:xfrm>
+            <a:off x="2403034" y="1395985"/>
+            <a:ext cx="1270332" cy="646331"/>
+          </a:xfrm>
+          <a:prstGeom prst="rect">
+            <a:avLst/>
+          </a:prstGeom>
+          <a:noFill/>
+          <a:ln>
+            <a:solidFill>
+              <a:schemeClr val="accent1"/>
+            </a:solidFill>
+          </a:ln>
+        </p:spPr>
+        <p:txBody>
+          <a:bodyPr wrap="square" rtlCol="0">
+            <a:spAutoFit/>
+          </a:bodyPr>
+          <a:lstStyle/>
+          <a:p>
+            <a:r>
+              <a:rPr lang="en-US" dirty="0" smtClean="0"/>
+              <a:t>Gateway 1</a:t>
             </a:r>
           </a:p>
           <a:p>
@@ -3753,7 +6322,7 @@
           <a:lstStyle/>
           <a:p>
             <a:r>
-              <a:rPr lang="en-US" smtClean="0"/>
+              <a:rPr lang="en-US" dirty="0" smtClean="0"/>
               <a:t>Load Balancer</a:t>
             </a:r>
             <a:endParaRPr lang="en-US" dirty="0"/>
@@ -4308,7 +6877,6 @@
               <a:rPr lang="en-US" sz="1200" dirty="0"/>
               <a:t>Web sockets over http long polling</a:t>
             </a:r>
-            <a:endParaRPr lang="en-US" sz="1200" dirty="0"/>
           </a:p>
         </p:txBody>
       </p:sp>

</xml_diff>

<commit_message>
update system design for caching
</commit_message>
<xml_diff>
--- a/design/System Design Notes.pptx
+++ b/design/System Design Notes.pptx
@@ -13,6 +13,7 @@
     <p:sldId id="262" r:id="rId7"/>
     <p:sldId id="263" r:id="rId8"/>
     <p:sldId id="256" r:id="rId9"/>
+    <p:sldId id="264" r:id="rId10"/>
   </p:sldIdLst>
   <p:sldSz cx="12192000" cy="6858000"/>
   <p:notesSz cx="6858000" cy="9144000"/>
@@ -250,7 +251,7 @@
           <a:p>
             <a:fld id="{1240214C-7864-3945-89BC-709B9AB7D230}" type="datetimeFigureOut">
               <a:rPr lang="en-US" smtClean="0"/>
-              <a:t>6/9/2019</a:t>
+              <a:t>6/11/2019</a:t>
             </a:fld>
             <a:endParaRPr lang="en-US"/>
           </a:p>
@@ -420,7 +421,7 @@
           <a:p>
             <a:fld id="{1240214C-7864-3945-89BC-709B9AB7D230}" type="datetimeFigureOut">
               <a:rPr lang="en-US" smtClean="0"/>
-              <a:t>6/9/2019</a:t>
+              <a:t>6/11/2019</a:t>
             </a:fld>
             <a:endParaRPr lang="en-US"/>
           </a:p>
@@ -600,7 +601,7 @@
           <a:p>
             <a:fld id="{1240214C-7864-3945-89BC-709B9AB7D230}" type="datetimeFigureOut">
               <a:rPr lang="en-US" smtClean="0"/>
-              <a:t>6/9/2019</a:t>
+              <a:t>6/11/2019</a:t>
             </a:fld>
             <a:endParaRPr lang="en-US"/>
           </a:p>
@@ -770,7 +771,7 @@
           <a:p>
             <a:fld id="{1240214C-7864-3945-89BC-709B9AB7D230}" type="datetimeFigureOut">
               <a:rPr lang="en-US" smtClean="0"/>
-              <a:t>6/9/2019</a:t>
+              <a:t>6/11/2019</a:t>
             </a:fld>
             <a:endParaRPr lang="en-US"/>
           </a:p>
@@ -1016,7 +1017,7 @@
           <a:p>
             <a:fld id="{1240214C-7864-3945-89BC-709B9AB7D230}" type="datetimeFigureOut">
               <a:rPr lang="en-US" smtClean="0"/>
-              <a:t>6/9/2019</a:t>
+              <a:t>6/11/2019</a:t>
             </a:fld>
             <a:endParaRPr lang="en-US"/>
           </a:p>
@@ -1248,7 +1249,7 @@
           <a:p>
             <a:fld id="{1240214C-7864-3945-89BC-709B9AB7D230}" type="datetimeFigureOut">
               <a:rPr lang="en-US" smtClean="0"/>
-              <a:t>6/9/2019</a:t>
+              <a:t>6/11/2019</a:t>
             </a:fld>
             <a:endParaRPr lang="en-US"/>
           </a:p>
@@ -1615,7 +1616,7 @@
           <a:p>
             <a:fld id="{1240214C-7864-3945-89BC-709B9AB7D230}" type="datetimeFigureOut">
               <a:rPr lang="en-US" smtClean="0"/>
-              <a:t>6/9/2019</a:t>
+              <a:t>6/11/2019</a:t>
             </a:fld>
             <a:endParaRPr lang="en-US"/>
           </a:p>
@@ -1733,7 +1734,7 @@
           <a:p>
             <a:fld id="{1240214C-7864-3945-89BC-709B9AB7D230}" type="datetimeFigureOut">
               <a:rPr lang="en-US" smtClean="0"/>
-              <a:t>6/9/2019</a:t>
+              <a:t>6/11/2019</a:t>
             </a:fld>
             <a:endParaRPr lang="en-US"/>
           </a:p>
@@ -1828,7 +1829,7 @@
           <a:p>
             <a:fld id="{1240214C-7864-3945-89BC-709B9AB7D230}" type="datetimeFigureOut">
               <a:rPr lang="en-US" smtClean="0"/>
-              <a:t>6/9/2019</a:t>
+              <a:t>6/11/2019</a:t>
             </a:fld>
             <a:endParaRPr lang="en-US"/>
           </a:p>
@@ -2105,7 +2106,7 @@
           <a:p>
             <a:fld id="{1240214C-7864-3945-89BC-709B9AB7D230}" type="datetimeFigureOut">
               <a:rPr lang="en-US" smtClean="0"/>
-              <a:t>6/9/2019</a:t>
+              <a:t>6/11/2019</a:t>
             </a:fld>
             <a:endParaRPr lang="en-US"/>
           </a:p>
@@ -2358,7 +2359,7 @@
           <a:p>
             <a:fld id="{1240214C-7864-3945-89BC-709B9AB7D230}" type="datetimeFigureOut">
               <a:rPr lang="en-US" smtClean="0"/>
-              <a:t>6/9/2019</a:t>
+              <a:t>6/11/2019</a:t>
             </a:fld>
             <a:endParaRPr lang="en-US"/>
           </a:p>
@@ -2571,7 +2572,7 @@
           <a:p>
             <a:fld id="{1240214C-7864-3945-89BC-709B9AB7D230}" type="datetimeFigureOut">
               <a:rPr lang="en-US" smtClean="0"/>
-              <a:t>6/9/2019</a:t>
+              <a:t>6/11/2019</a:t>
             </a:fld>
             <a:endParaRPr lang="en-US"/>
           </a:p>
@@ -5554,7 +5555,6 @@
               <a:rPr lang="en-US" sz="2000" dirty="0" smtClean="0"/>
               <a:t>Single point of failure, have to restart everything instead of at few points</a:t>
             </a:r>
-            <a:endParaRPr lang="en-US" sz="2000" dirty="0" smtClean="0"/>
           </a:p>
         </p:txBody>
       </p:sp>
@@ -6022,7 +6022,6 @@
               <a:rPr lang="en-US" sz="2000" dirty="0" smtClean="0"/>
               <a:t>Writes to master, reads to slaves, slave becomes master if needed</a:t>
             </a:r>
-            <a:endParaRPr lang="en-US" sz="2000" dirty="0" smtClean="0"/>
           </a:p>
         </p:txBody>
       </p:sp>
@@ -6330,7 +6329,6 @@
               <a:rPr lang="en-US" dirty="0" smtClean="0"/>
               <a:t>Service</a:t>
             </a:r>
-            <a:endParaRPr lang="en-US" dirty="0" smtClean="0"/>
           </a:p>
           <a:p>
             <a:endParaRPr lang="en-US" dirty="0"/>
@@ -6396,7 +6394,6 @@
               <a:rPr lang="en-US" sz="1200" dirty="0" smtClean="0"/>
               <a:t>)</a:t>
             </a:r>
-            <a:endParaRPr lang="en-US" sz="1200" dirty="0" smtClean="0"/>
           </a:p>
           <a:p>
             <a:pPr marL="342900" indent="-342900">
@@ -6736,7 +6733,6 @@
               <a:rPr lang="en-US" dirty="0" smtClean="0"/>
               <a:t>Service</a:t>
             </a:r>
-            <a:endParaRPr lang="en-US" dirty="0" smtClean="0"/>
           </a:p>
           <a:p>
             <a:endParaRPr lang="en-US" dirty="0"/>
@@ -6813,7 +6809,6 @@
               <a:rPr lang="en-US" sz="1200" dirty="0" smtClean="0"/>
               <a:t>Web socket</a:t>
             </a:r>
-            <a:endParaRPr lang="en-US" sz="1200" dirty="0" smtClean="0"/>
           </a:p>
         </p:txBody>
       </p:sp>
@@ -6854,7 +6849,6 @@
               <a:rPr lang="en-US" dirty="0" smtClean="0"/>
               <a:t>Service</a:t>
             </a:r>
-            <a:endParaRPr lang="en-US" dirty="0" smtClean="0"/>
           </a:p>
           <a:p>
             <a:endParaRPr lang="en-US" dirty="0"/>
@@ -6959,13 +6953,8 @@
           <a:p>
             <a:r>
               <a:rPr lang="en-US" dirty="0" smtClean="0"/>
-              <a:t>Client </a:t>
-            </a:r>
-            <a:r>
-              <a:rPr lang="en-US" dirty="0" smtClean="0"/>
-              <a:t>2</a:t>
-            </a:r>
-            <a:endParaRPr lang="en-US" dirty="0" smtClean="0"/>
+              <a:t>Client 2</a:t>
+            </a:r>
           </a:p>
           <a:p>
             <a:endParaRPr lang="en-US" dirty="0"/>
@@ -7054,7 +7043,6 @@
               <a:rPr lang="en-US" sz="1200" dirty="0" smtClean="0"/>
               <a:t>Client Server Protocol (http)</a:t>
             </a:r>
-            <a:endParaRPr lang="en-US" sz="1200" dirty="0" smtClean="0"/>
           </a:p>
         </p:txBody>
       </p:sp>
@@ -7095,7 +7083,6 @@
               <a:rPr lang="en-US" dirty="0" smtClean="0"/>
               <a:t>Service</a:t>
             </a:r>
-            <a:endParaRPr lang="en-US" dirty="0" smtClean="0"/>
           </a:p>
           <a:p>
             <a:endParaRPr lang="en-US" dirty="0"/>
@@ -7388,7 +7375,6 @@
               <a:rPr lang="en-US" dirty="0" smtClean="0"/>
               <a:t>Service</a:t>
             </a:r>
-            <a:endParaRPr lang="en-US" dirty="0" smtClean="0"/>
           </a:p>
           <a:p>
             <a:endParaRPr lang="en-US" dirty="0"/>
@@ -9030,6 +9016,481 @@
     <p:extLst>
       <p:ext uri="{BB962C8B-B14F-4D97-AF65-F5344CB8AC3E}">
         <p14:creationId xmlns:p14="http://schemas.microsoft.com/office/powerpoint/2010/main" val="1733889212"/>
+      </p:ext>
+    </p:extLst>
+  </p:cSld>
+  <p:clrMapOvr>
+    <a:masterClrMapping/>
+  </p:clrMapOvr>
+</p:sld>
+</file>
+
+<file path=ppt/slides/slide9.xml><?xml version="1.0" encoding="utf-8"?>
+<p:sld xmlns:a="http://schemas.openxmlformats.org/drawingml/2006/main" xmlns:r="http://schemas.openxmlformats.org/officeDocument/2006/relationships" xmlns:p="http://schemas.openxmlformats.org/presentationml/2006/main">
+  <p:cSld>
+    <p:spTree>
+      <p:nvGrpSpPr>
+        <p:cNvPr id="1" name=""/>
+        <p:cNvGrpSpPr/>
+        <p:nvPr/>
+      </p:nvGrpSpPr>
+      <p:grpSpPr>
+        <a:xfrm>
+          <a:off x="0" y="0"/>
+          <a:ext cx="0" cy="0"/>
+          <a:chOff x="0" y="0"/>
+          <a:chExt cx="0" cy="0"/>
+        </a:xfrm>
+      </p:grpSpPr>
+      <p:sp>
+        <p:nvSpPr>
+          <p:cNvPr id="4" name="Rectangle 3"/>
+          <p:cNvSpPr/>
+          <p:nvPr/>
+        </p:nvSpPr>
+        <p:spPr>
+          <a:xfrm>
+            <a:off x="4550987" y="0"/>
+            <a:ext cx="3111054" cy="523220"/>
+          </a:xfrm>
+          <a:prstGeom prst="rect">
+            <a:avLst/>
+          </a:prstGeom>
+          <a:noFill/>
+        </p:spPr>
+        <p:txBody>
+          <a:bodyPr wrap="square" lIns="91440" tIns="45720" rIns="91440" bIns="45720">
+            <a:spAutoFit/>
+          </a:bodyPr>
+          <a:lstStyle/>
+          <a:p>
+            <a:pPr algn="ctr"/>
+            <a:r>
+              <a:rPr lang="en-US" sz="2800" dirty="0" smtClean="0">
+                <a:ln w="0"/>
+                <a:solidFill>
+                  <a:schemeClr val="accent2"/>
+                </a:solidFill>
+                <a:effectLst>
+                  <a:outerShdw blurRad="38100" dist="19050" dir="2700000" algn="tl" rotWithShape="0">
+                    <a:schemeClr val="dk1">
+                      <a:alpha val="40000"/>
+                    </a:schemeClr>
+                  </a:outerShdw>
+                </a:effectLst>
+              </a:rPr>
+              <a:t>Distributed Caching</a:t>
+            </a:r>
+            <a:endParaRPr lang="en-US" sz="5400" b="0" cap="none" spc="0" dirty="0">
+              <a:ln w="0"/>
+              <a:solidFill>
+                <a:schemeClr val="accent2"/>
+              </a:solidFill>
+              <a:effectLst>
+                <a:outerShdw blurRad="38100" dist="19050" dir="2700000" algn="tl" rotWithShape="0">
+                  <a:schemeClr val="dk1">
+                    <a:alpha val="40000"/>
+                  </a:schemeClr>
+                </a:outerShdw>
+              </a:effectLst>
+            </a:endParaRPr>
+          </a:p>
+        </p:txBody>
+      </p:sp>
+      <p:sp>
+        <p:nvSpPr>
+          <p:cNvPr id="7" name="Content Placeholder 2"/>
+          <p:cNvSpPr>
+            <a:spLocks noGrp="1"/>
+          </p:cNvSpPr>
+          <p:nvPr>
+            <p:ph idx="1"/>
+          </p:nvPr>
+        </p:nvSpPr>
+        <p:spPr>
+          <a:xfrm>
+            <a:off x="772086" y="773814"/>
+            <a:ext cx="5093043" cy="5506216"/>
+          </a:xfrm>
+        </p:spPr>
+        <p:txBody>
+          <a:bodyPr>
+            <a:normAutofit fontScale="77500" lnSpcReduction="20000"/>
+          </a:bodyPr>
+          <a:lstStyle/>
+          <a:p>
+            <a:pPr marL="0" indent="0">
+              <a:buNone/>
+            </a:pPr>
+            <a:r>
+              <a:rPr lang="en-US" sz="2000" dirty="0" smtClean="0"/>
+              <a:t>Why</a:t>
+            </a:r>
+          </a:p>
+          <a:p>
+            <a:pPr marL="342900" indent="-342900">
+              <a:buAutoNum type="arabicParenR"/>
+            </a:pPr>
+            <a:r>
+              <a:rPr lang="en-US" sz="2000" dirty="0" smtClean="0"/>
+              <a:t>Avoid </a:t>
+            </a:r>
+            <a:r>
+              <a:rPr lang="en-US" sz="2000" dirty="0"/>
+              <a:t>Network Call</a:t>
+            </a:r>
+          </a:p>
+          <a:p>
+            <a:pPr marL="342900" indent="-342900">
+              <a:buAutoNum type="arabicParenR"/>
+            </a:pPr>
+            <a:r>
+              <a:rPr lang="en-US" sz="2000" dirty="0"/>
+              <a:t>Avoid computations</a:t>
+            </a:r>
+          </a:p>
+          <a:p>
+            <a:pPr marL="342900" indent="-342900">
+              <a:buAutoNum type="arabicParenR"/>
+            </a:pPr>
+            <a:r>
+              <a:rPr lang="en-US" sz="2000" dirty="0"/>
+              <a:t>Reduce DB load</a:t>
+            </a:r>
+          </a:p>
+          <a:p>
+            <a:endParaRPr lang="en-US" sz="2000" dirty="0" smtClean="0"/>
+          </a:p>
+          <a:p>
+            <a:r>
+              <a:rPr lang="en-US" sz="2000" dirty="0" smtClean="0"/>
+              <a:t>If cache closer to server, faster, but can be inconsistent between servers (in memory)</a:t>
+            </a:r>
+          </a:p>
+          <a:p>
+            <a:r>
+              <a:rPr lang="en-US" sz="2000" dirty="0" smtClean="0"/>
+              <a:t>Global cache (</a:t>
+            </a:r>
+            <a:r>
+              <a:rPr lang="en-US" sz="2000" dirty="0" err="1" smtClean="0"/>
+              <a:t>Redis</a:t>
+            </a:r>
+            <a:r>
+              <a:rPr lang="en-US" sz="2000" dirty="0" smtClean="0"/>
+              <a:t>), can recover when failing, and can scale independently</a:t>
+            </a:r>
+          </a:p>
+          <a:p>
+            <a:endParaRPr lang="en-US" sz="2000" dirty="0"/>
+          </a:p>
+          <a:p>
+            <a:r>
+              <a:rPr lang="en-US" sz="2000" dirty="0" smtClean="0"/>
+              <a:t>Write-through </a:t>
+            </a:r>
+          </a:p>
+          <a:p>
+            <a:pPr lvl="1"/>
+            <a:r>
+              <a:rPr lang="en-US" sz="1200" dirty="0" smtClean="0"/>
+              <a:t>Update cache first, then update DB</a:t>
+            </a:r>
+          </a:p>
+          <a:p>
+            <a:pPr lvl="1"/>
+            <a:r>
+              <a:rPr lang="en-US" sz="1600" dirty="0" smtClean="0"/>
+              <a:t>Can wait and send to DB in both, for noncritical data, for saving network calls</a:t>
+            </a:r>
+          </a:p>
+          <a:p>
+            <a:pPr lvl="1"/>
+            <a:r>
+              <a:rPr lang="en-US" sz="1600" dirty="0" smtClean="0"/>
+              <a:t>Not practical for multiple caches</a:t>
+            </a:r>
+          </a:p>
+          <a:p>
+            <a:r>
+              <a:rPr lang="en-US" sz="2000" dirty="0" smtClean="0"/>
+              <a:t>Write-back (performance issues)</a:t>
+            </a:r>
+          </a:p>
+          <a:p>
+            <a:pPr lvl="1"/>
+            <a:r>
+              <a:rPr lang="en-US" sz="1600" dirty="0"/>
+              <a:t>Update DB first, then make entry in </a:t>
+            </a:r>
+            <a:r>
+              <a:rPr lang="en-US" sz="1600" dirty="0" smtClean="0"/>
+              <a:t>cache/ or invalidate</a:t>
+            </a:r>
+            <a:endParaRPr lang="en-US" sz="1600" dirty="0"/>
+          </a:p>
+          <a:p>
+            <a:pPr lvl="1"/>
+            <a:r>
+              <a:rPr lang="en-US" sz="1600" dirty="0" smtClean="0"/>
+              <a:t>When hit cache on GET, then go to </a:t>
+            </a:r>
+            <a:r>
+              <a:rPr lang="en-US" sz="1600" dirty="0" err="1" smtClean="0"/>
+              <a:t>db</a:t>
+            </a:r>
+            <a:r>
+              <a:rPr lang="en-US" sz="1600" dirty="0" smtClean="0"/>
+              <a:t>, and also update cache</a:t>
+            </a:r>
+          </a:p>
+          <a:p>
+            <a:pPr lvl="1"/>
+            <a:r>
+              <a:rPr lang="en-US" sz="1600" dirty="0" smtClean="0"/>
+              <a:t>Hit cache, invalidate entry if it is there</a:t>
+            </a:r>
+            <a:endParaRPr lang="en-US" sz="1600" dirty="0"/>
+          </a:p>
+          <a:p>
+            <a:r>
+              <a:rPr lang="en-US" sz="2000" dirty="0" smtClean="0"/>
+              <a:t>Hybrid</a:t>
+            </a:r>
+          </a:p>
+          <a:p>
+            <a:pPr lvl="1"/>
+            <a:r>
+              <a:rPr lang="en-US" sz="1600" dirty="0" smtClean="0"/>
+              <a:t>If not critical info, write to cache, wait, and take entries in bulk and write to DB</a:t>
+            </a:r>
+          </a:p>
+        </p:txBody>
+      </p:sp>
+      <p:sp>
+        <p:nvSpPr>
+          <p:cNvPr id="8" name="Content Placeholder 2"/>
+          <p:cNvSpPr txBox="1">
+            <a:spLocks/>
+          </p:cNvSpPr>
+          <p:nvPr/>
+        </p:nvSpPr>
+        <p:spPr>
+          <a:xfrm>
+            <a:off x="6462644" y="926214"/>
+            <a:ext cx="5093043" cy="3979342"/>
+          </a:xfrm>
+          <a:prstGeom prst="rect">
+            <a:avLst/>
+          </a:prstGeom>
+        </p:spPr>
+        <p:txBody>
+          <a:bodyPr vert="horz" lIns="91440" tIns="45720" rIns="91440" bIns="45720" rtlCol="0">
+            <a:normAutofit/>
+          </a:bodyPr>
+          <a:lstStyle>
+            <a:lvl1pPr marL="228600" indent="-228600" algn="l" defTabSz="914400" rtl="0" eaLnBrk="1" latinLnBrk="0" hangingPunct="1">
+              <a:lnSpc>
+                <a:spcPct val="90000"/>
+              </a:lnSpc>
+              <a:spcBef>
+                <a:spcPts val="1000"/>
+              </a:spcBef>
+              <a:buFont typeface="Arial"/>
+              <a:buChar char="•"/>
+              <a:defRPr sz="2800" kern="1200">
+                <a:solidFill>
+                  <a:schemeClr val="tx1"/>
+                </a:solidFill>
+                <a:latin typeface="+mn-lt"/>
+                <a:ea typeface="+mn-ea"/>
+                <a:cs typeface="+mn-cs"/>
+              </a:defRPr>
+            </a:lvl1pPr>
+            <a:lvl2pPr marL="685800" indent="-228600" algn="l" defTabSz="914400" rtl="0" eaLnBrk="1" latinLnBrk="0" hangingPunct="1">
+              <a:lnSpc>
+                <a:spcPct val="90000"/>
+              </a:lnSpc>
+              <a:spcBef>
+                <a:spcPts val="500"/>
+              </a:spcBef>
+              <a:buFont typeface="Arial"/>
+              <a:buChar char="•"/>
+              <a:defRPr sz="2400" kern="1200">
+                <a:solidFill>
+                  <a:schemeClr val="tx1"/>
+                </a:solidFill>
+                <a:latin typeface="+mn-lt"/>
+                <a:ea typeface="+mn-ea"/>
+                <a:cs typeface="+mn-cs"/>
+              </a:defRPr>
+            </a:lvl2pPr>
+            <a:lvl3pPr marL="1143000" indent="-228600" algn="l" defTabSz="914400" rtl="0" eaLnBrk="1" latinLnBrk="0" hangingPunct="1">
+              <a:lnSpc>
+                <a:spcPct val="90000"/>
+              </a:lnSpc>
+              <a:spcBef>
+                <a:spcPts val="500"/>
+              </a:spcBef>
+              <a:buFont typeface="Arial"/>
+              <a:buChar char="•"/>
+              <a:defRPr sz="2000" kern="1200">
+                <a:solidFill>
+                  <a:schemeClr val="tx1"/>
+                </a:solidFill>
+                <a:latin typeface="+mn-lt"/>
+                <a:ea typeface="+mn-ea"/>
+                <a:cs typeface="+mn-cs"/>
+              </a:defRPr>
+            </a:lvl3pPr>
+            <a:lvl4pPr marL="1600200" indent="-228600" algn="l" defTabSz="914400" rtl="0" eaLnBrk="1" latinLnBrk="0" hangingPunct="1">
+              <a:lnSpc>
+                <a:spcPct val="90000"/>
+              </a:lnSpc>
+              <a:spcBef>
+                <a:spcPts val="500"/>
+              </a:spcBef>
+              <a:buFont typeface="Arial"/>
+              <a:buChar char="•"/>
+              <a:defRPr sz="1800" kern="1200">
+                <a:solidFill>
+                  <a:schemeClr val="tx1"/>
+                </a:solidFill>
+                <a:latin typeface="+mn-lt"/>
+                <a:ea typeface="+mn-ea"/>
+                <a:cs typeface="+mn-cs"/>
+              </a:defRPr>
+            </a:lvl4pPr>
+            <a:lvl5pPr marL="2057400" indent="-228600" algn="l" defTabSz="914400" rtl="0" eaLnBrk="1" latinLnBrk="0" hangingPunct="1">
+              <a:lnSpc>
+                <a:spcPct val="90000"/>
+              </a:lnSpc>
+              <a:spcBef>
+                <a:spcPts val="500"/>
+              </a:spcBef>
+              <a:buFont typeface="Arial"/>
+              <a:buChar char="•"/>
+              <a:defRPr sz="1800" kern="1200">
+                <a:solidFill>
+                  <a:schemeClr val="tx1"/>
+                </a:solidFill>
+                <a:latin typeface="+mn-lt"/>
+                <a:ea typeface="+mn-ea"/>
+                <a:cs typeface="+mn-cs"/>
+              </a:defRPr>
+            </a:lvl5pPr>
+            <a:lvl6pPr marL="2514600" indent="-228600" algn="l" defTabSz="914400" rtl="0" eaLnBrk="1" latinLnBrk="0" hangingPunct="1">
+              <a:lnSpc>
+                <a:spcPct val="90000"/>
+              </a:lnSpc>
+              <a:spcBef>
+                <a:spcPts val="500"/>
+              </a:spcBef>
+              <a:buFont typeface="Arial"/>
+              <a:buChar char="•"/>
+              <a:defRPr sz="1800" kern="1200">
+                <a:solidFill>
+                  <a:schemeClr val="tx1"/>
+                </a:solidFill>
+                <a:latin typeface="+mn-lt"/>
+                <a:ea typeface="+mn-ea"/>
+                <a:cs typeface="+mn-cs"/>
+              </a:defRPr>
+            </a:lvl6pPr>
+            <a:lvl7pPr marL="2971800" indent="-228600" algn="l" defTabSz="914400" rtl="0" eaLnBrk="1" latinLnBrk="0" hangingPunct="1">
+              <a:lnSpc>
+                <a:spcPct val="90000"/>
+              </a:lnSpc>
+              <a:spcBef>
+                <a:spcPts val="500"/>
+              </a:spcBef>
+              <a:buFont typeface="Arial"/>
+              <a:buChar char="•"/>
+              <a:defRPr sz="1800" kern="1200">
+                <a:solidFill>
+                  <a:schemeClr val="tx1"/>
+                </a:solidFill>
+                <a:latin typeface="+mn-lt"/>
+                <a:ea typeface="+mn-ea"/>
+                <a:cs typeface="+mn-cs"/>
+              </a:defRPr>
+            </a:lvl7pPr>
+            <a:lvl8pPr marL="3429000" indent="-228600" algn="l" defTabSz="914400" rtl="0" eaLnBrk="1" latinLnBrk="0" hangingPunct="1">
+              <a:lnSpc>
+                <a:spcPct val="90000"/>
+              </a:lnSpc>
+              <a:spcBef>
+                <a:spcPts val="500"/>
+              </a:spcBef>
+              <a:buFont typeface="Arial"/>
+              <a:buChar char="•"/>
+              <a:defRPr sz="1800" kern="1200">
+                <a:solidFill>
+                  <a:schemeClr val="tx1"/>
+                </a:solidFill>
+                <a:latin typeface="+mn-lt"/>
+                <a:ea typeface="+mn-ea"/>
+                <a:cs typeface="+mn-cs"/>
+              </a:defRPr>
+            </a:lvl8pPr>
+            <a:lvl9pPr marL="3886200" indent="-228600" algn="l" defTabSz="914400" rtl="0" eaLnBrk="1" latinLnBrk="0" hangingPunct="1">
+              <a:lnSpc>
+                <a:spcPct val="90000"/>
+              </a:lnSpc>
+              <a:spcBef>
+                <a:spcPts val="500"/>
+              </a:spcBef>
+              <a:buFont typeface="Arial"/>
+              <a:buChar char="•"/>
+              <a:defRPr sz="1800" kern="1200">
+                <a:solidFill>
+                  <a:schemeClr val="tx1"/>
+                </a:solidFill>
+                <a:latin typeface="+mn-lt"/>
+                <a:ea typeface="+mn-ea"/>
+                <a:cs typeface="+mn-cs"/>
+              </a:defRPr>
+            </a:lvl9pPr>
+          </a:lstStyle>
+          <a:p>
+            <a:pPr marL="342900" indent="-342900">
+              <a:buFont typeface="Arial"/>
+              <a:buAutoNum type="arabicParenR"/>
+            </a:pPr>
+            <a:r>
+              <a:rPr lang="en-US" sz="2000" dirty="0" smtClean="0"/>
+              <a:t>Eviction Policy</a:t>
+            </a:r>
+          </a:p>
+          <a:p>
+            <a:pPr marL="342900" indent="-342900">
+              <a:buFont typeface="Arial"/>
+              <a:buAutoNum type="arabicParenR"/>
+            </a:pPr>
+            <a:r>
+              <a:rPr lang="en-US" sz="2000" dirty="0" smtClean="0"/>
+              <a:t>Thrashing – constantly inputting and outputting to cache without using results</a:t>
+            </a:r>
+          </a:p>
+          <a:p>
+            <a:pPr marL="342900" indent="-342900">
+              <a:buFont typeface="Arial"/>
+              <a:buAutoNum type="arabicParenR"/>
+            </a:pPr>
+            <a:r>
+              <a:rPr lang="en-US" sz="2000" dirty="0" smtClean="0"/>
+              <a:t>Consistency</a:t>
+            </a:r>
+          </a:p>
+          <a:p>
+            <a:endParaRPr lang="en-US" sz="2000" dirty="0" smtClean="0"/>
+          </a:p>
+        </p:txBody>
+      </p:sp>
+    </p:spTree>
+    <p:extLst>
+      <p:ext uri="{BB962C8B-B14F-4D97-AF65-F5344CB8AC3E}">
+        <p14:creationId xmlns:p14="http://schemas.microsoft.com/office/powerpoint/2010/main" val="1134319611"/>
       </p:ext>
     </p:extLst>
   </p:cSld>

</xml_diff>